<commit_message>
updating models. moving combined_features to live under models
</commit_message>
<xml_diff>
--- a/FinalPresentation.pptx
+++ b/FinalPresentation.pptx
@@ -5,10 +5,10 @@
     <p:sldMasterId id="2147483648" r:id="rId1"/>
   </p:sldMasterIdLst>
   <p:notesMasterIdLst>
-    <p:notesMasterId r:id="rId23"/>
+    <p:notesMasterId r:id="rId28"/>
   </p:notesMasterIdLst>
   <p:handoutMasterIdLst>
-    <p:handoutMasterId r:id="rId24"/>
+    <p:handoutMasterId r:id="rId29"/>
   </p:handoutMasterIdLst>
   <p:sldIdLst>
     <p:sldId id="256" r:id="rId2"/>
@@ -26,12 +26,17 @@
     <p:sldId id="263" r:id="rId14"/>
     <p:sldId id="264" r:id="rId15"/>
     <p:sldId id="265" r:id="rId16"/>
-    <p:sldId id="266" r:id="rId17"/>
+    <p:sldId id="283" r:id="rId17"/>
     <p:sldId id="267" r:id="rId18"/>
-    <p:sldId id="273" r:id="rId19"/>
-    <p:sldId id="274" r:id="rId20"/>
-    <p:sldId id="268" r:id="rId21"/>
-    <p:sldId id="269" r:id="rId22"/>
+    <p:sldId id="277" r:id="rId19"/>
+    <p:sldId id="273" r:id="rId20"/>
+    <p:sldId id="274" r:id="rId21"/>
+    <p:sldId id="268" r:id="rId22"/>
+    <p:sldId id="281" r:id="rId23"/>
+    <p:sldId id="282" r:id="rId24"/>
+    <p:sldId id="278" r:id="rId25"/>
+    <p:sldId id="280" r:id="rId26"/>
+    <p:sldId id="279" r:id="rId27"/>
   </p:sldIdLst>
   <p:sldSz cx="9144000" cy="6858000" type="screen4x3"/>
   <p:notesSz cx="6858000" cy="9144000"/>
@@ -215,7 +220,8 @@
           <a:p>
             <a:fld id="{7B7538EB-ED4A-824F-9E5A-77D69CDA3FFB}" type="datetime1">
               <a:rPr lang="en-US" smtClean="0"/>
-              <a:t>12/15/15</a:t>
+              <a:pPr/>
+              <a:t>12/17/15</a:t>
             </a:fld>
             <a:endParaRPr lang="en-US"/>
           </a:p>
@@ -281,6 +287,7 @@
           <a:p>
             <a:fld id="{E23874AC-BBE8-4C4F-B449-0D7F1B08745F}" type="slidenum">
               <a:rPr lang="en-US" smtClean="0"/>
+              <a:pPr/>
               <a:t>‹#›</a:t>
             </a:fld>
             <a:endParaRPr lang="en-US"/>
@@ -376,7 +383,8 @@
           <a:p>
             <a:fld id="{DE2AC196-93EC-7444-9E78-D5CC1140CC1D}" type="datetime1">
               <a:rPr lang="en-US" smtClean="0"/>
-              <a:t>12/15/15</a:t>
+              <a:pPr/>
+              <a:t>12/17/15</a:t>
             </a:fld>
             <a:endParaRPr lang="en-US"/>
           </a:p>
@@ -537,6 +545,7 @@
           <a:p>
             <a:fld id="{5FED2AC5-D388-6E42-8749-E94A23CD96A0}" type="slidenum">
               <a:rPr lang="en-US" smtClean="0"/>
+              <a:pPr/>
               <a:t>‹#›</a:t>
             </a:fld>
             <a:endParaRPr lang="en-US"/>
@@ -709,6 +718,7 @@
           <a:p>
             <a:fld id="{5FED2AC5-D388-6E42-8749-E94A23CD96A0}" type="slidenum">
               <a:rPr lang="en-US" smtClean="0"/>
+              <a:pPr/>
               <a:t>3</a:t>
             </a:fld>
             <a:endParaRPr lang="en-US"/>
@@ -942,7 +952,8 @@
           <a:p>
             <a:fld id="{9B4E26E5-939F-5B4A-84C4-5B727F745DAC}" type="datetime1">
               <a:rPr lang="en-US" smtClean="0"/>
-              <a:t>12/15/15</a:t>
+              <a:pPr/>
+              <a:t>12/17/15</a:t>
             </a:fld>
             <a:endParaRPr lang="en-US"/>
           </a:p>
@@ -984,6 +995,7 @@
           <a:p>
             <a:fld id="{43F1BE90-FE9C-FB4E-A18A-9792DF813A96}" type="slidenum">
               <a:rPr lang="en-US" smtClean="0"/>
+              <a:pPr/>
               <a:t>‹#›</a:t>
             </a:fld>
             <a:endParaRPr lang="en-US"/>
@@ -1107,7 +1119,8 @@
           <a:p>
             <a:fld id="{83129D36-3A9E-854B-9A6A-6F50EE41B8AE}" type="datetime1">
               <a:rPr lang="en-US" smtClean="0"/>
-              <a:t>12/15/15</a:t>
+              <a:pPr/>
+              <a:t>12/17/15</a:t>
             </a:fld>
             <a:endParaRPr lang="en-US"/>
           </a:p>
@@ -1149,6 +1162,7 @@
           <a:p>
             <a:fld id="{43F1BE90-FE9C-FB4E-A18A-9792DF813A96}" type="slidenum">
               <a:rPr lang="en-US" smtClean="0"/>
+              <a:pPr/>
               <a:t>‹#›</a:t>
             </a:fld>
             <a:endParaRPr lang="en-US"/>
@@ -1282,7 +1296,8 @@
           <a:p>
             <a:fld id="{F4175A00-F00A-0F47-A3C5-FEBD0231010D}" type="datetime1">
               <a:rPr lang="en-US" smtClean="0"/>
-              <a:t>12/15/15</a:t>
+              <a:pPr/>
+              <a:t>12/17/15</a:t>
             </a:fld>
             <a:endParaRPr lang="en-US"/>
           </a:p>
@@ -1324,6 +1339,7 @@
           <a:p>
             <a:fld id="{43F1BE90-FE9C-FB4E-A18A-9792DF813A96}" type="slidenum">
               <a:rPr lang="en-US" smtClean="0"/>
+              <a:pPr/>
               <a:t>‹#›</a:t>
             </a:fld>
             <a:endParaRPr lang="en-US"/>
@@ -1447,7 +1463,8 @@
           <a:p>
             <a:fld id="{380E7C7A-B23E-B24A-8733-97A84B0DCA49}" type="datetime1">
               <a:rPr lang="en-US" smtClean="0"/>
-              <a:t>12/15/15</a:t>
+              <a:pPr/>
+              <a:t>12/17/15</a:t>
             </a:fld>
             <a:endParaRPr lang="en-US"/>
           </a:p>
@@ -1489,6 +1506,7 @@
           <a:p>
             <a:fld id="{43F1BE90-FE9C-FB4E-A18A-9792DF813A96}" type="slidenum">
               <a:rPr lang="en-US" smtClean="0"/>
+              <a:pPr/>
               <a:t>‹#›</a:t>
             </a:fld>
             <a:endParaRPr lang="en-US"/>
@@ -1688,7 +1706,8 @@
           <a:p>
             <a:fld id="{5EDB3573-33BE-CB43-AED9-96978F10F7CB}" type="datetime1">
               <a:rPr lang="en-US" smtClean="0"/>
-              <a:t>12/15/15</a:t>
+              <a:pPr/>
+              <a:t>12/17/15</a:t>
             </a:fld>
             <a:endParaRPr lang="en-US"/>
           </a:p>
@@ -1730,6 +1749,7 @@
           <a:p>
             <a:fld id="{43F1BE90-FE9C-FB4E-A18A-9792DF813A96}" type="slidenum">
               <a:rPr lang="en-US" smtClean="0"/>
+              <a:pPr/>
               <a:t>‹#›</a:t>
             </a:fld>
             <a:endParaRPr lang="en-US"/>
@@ -1971,7 +1991,8 @@
           <a:p>
             <a:fld id="{C3652D88-4C5A-4843-930D-E3D2FB180C8B}" type="datetime1">
               <a:rPr lang="en-US" smtClean="0"/>
-              <a:t>12/15/15</a:t>
+              <a:pPr/>
+              <a:t>12/17/15</a:t>
             </a:fld>
             <a:endParaRPr lang="en-US"/>
           </a:p>
@@ -2013,6 +2034,7 @@
           <a:p>
             <a:fld id="{43F1BE90-FE9C-FB4E-A18A-9792DF813A96}" type="slidenum">
               <a:rPr lang="en-US" smtClean="0"/>
+              <a:pPr/>
               <a:t>‹#›</a:t>
             </a:fld>
             <a:endParaRPr lang="en-US"/>
@@ -2388,7 +2410,8 @@
           <a:p>
             <a:fld id="{8FB5AAD1-5A58-1842-BF23-B7C78A728B6E}" type="datetime1">
               <a:rPr lang="en-US" smtClean="0"/>
-              <a:t>12/15/15</a:t>
+              <a:pPr/>
+              <a:t>12/17/15</a:t>
             </a:fld>
             <a:endParaRPr lang="en-US"/>
           </a:p>
@@ -2430,6 +2453,7 @@
           <a:p>
             <a:fld id="{43F1BE90-FE9C-FB4E-A18A-9792DF813A96}" type="slidenum">
               <a:rPr lang="en-US" smtClean="0"/>
+              <a:pPr/>
               <a:t>‹#›</a:t>
             </a:fld>
             <a:endParaRPr lang="en-US"/>
@@ -2501,7 +2525,8 @@
           <a:p>
             <a:fld id="{C05034B4-28F4-FB45-A827-80D386119DDC}" type="datetime1">
               <a:rPr lang="en-US" smtClean="0"/>
-              <a:t>12/15/15</a:t>
+              <a:pPr/>
+              <a:t>12/17/15</a:t>
             </a:fld>
             <a:endParaRPr lang="en-US"/>
           </a:p>
@@ -2543,6 +2568,7 @@
           <a:p>
             <a:fld id="{43F1BE90-FE9C-FB4E-A18A-9792DF813A96}" type="slidenum">
               <a:rPr lang="en-US" smtClean="0"/>
+              <a:pPr/>
               <a:t>‹#›</a:t>
             </a:fld>
             <a:endParaRPr lang="en-US"/>
@@ -2591,7 +2617,8 @@
           <a:p>
             <a:fld id="{1AE5FCF6-443D-FE4F-BC6D-03009D78E84F}" type="datetime1">
               <a:rPr lang="en-US" smtClean="0"/>
-              <a:t>12/15/15</a:t>
+              <a:pPr/>
+              <a:t>12/17/15</a:t>
             </a:fld>
             <a:endParaRPr lang="en-US"/>
           </a:p>
@@ -2633,6 +2660,7 @@
           <a:p>
             <a:fld id="{43F1BE90-FE9C-FB4E-A18A-9792DF813A96}" type="slidenum">
               <a:rPr lang="en-US" smtClean="0"/>
+              <a:pPr/>
               <a:t>‹#›</a:t>
             </a:fld>
             <a:endParaRPr lang="en-US"/>
@@ -2863,7 +2891,8 @@
           <a:p>
             <a:fld id="{7DAE50BD-CCE4-454D-9E10-26EB1BD059E5}" type="datetime1">
               <a:rPr lang="en-US" smtClean="0"/>
-              <a:t>12/15/15</a:t>
+              <a:pPr/>
+              <a:t>12/17/15</a:t>
             </a:fld>
             <a:endParaRPr lang="en-US"/>
           </a:p>
@@ -2905,6 +2934,7 @@
           <a:p>
             <a:fld id="{43F1BE90-FE9C-FB4E-A18A-9792DF813A96}" type="slidenum">
               <a:rPr lang="en-US" smtClean="0"/>
+              <a:pPr/>
               <a:t>‹#›</a:t>
             </a:fld>
             <a:endParaRPr lang="en-US"/>
@@ -3111,7 +3141,8 @@
           <a:p>
             <a:fld id="{F12F5EFF-B37D-934E-B19A-DE804F70C788}" type="datetime1">
               <a:rPr lang="en-US" smtClean="0"/>
-              <a:t>12/15/15</a:t>
+              <a:pPr/>
+              <a:t>12/17/15</a:t>
             </a:fld>
             <a:endParaRPr lang="en-US"/>
           </a:p>
@@ -3153,6 +3184,7 @@
           <a:p>
             <a:fld id="{43F1BE90-FE9C-FB4E-A18A-9792DF813A96}" type="slidenum">
               <a:rPr lang="en-US" smtClean="0"/>
+              <a:pPr/>
               <a:t>‹#›</a:t>
             </a:fld>
             <a:endParaRPr lang="en-US"/>
@@ -3172,7 +3204,7 @@
   <p:cSld>
     <p:bg>
       <p:bgRef idx="1001">
-        <a:schemeClr val="bg1"/>
+        <a:schemeClr val="bg2"/>
       </p:bgRef>
     </p:bg>
     <p:spTree>
@@ -3319,7 +3351,8 @@
           <a:p>
             <a:fld id="{1E19F6D2-17CE-264F-9DF1-2C69D7FC091A}" type="datetime1">
               <a:rPr lang="en-US" smtClean="0"/>
-              <a:t>12/15/15</a:t>
+              <a:pPr/>
+              <a:t>12/17/15</a:t>
             </a:fld>
             <a:endParaRPr lang="en-US"/>
           </a:p>
@@ -3397,6 +3430,7 @@
           <a:p>
             <a:fld id="{43F1BE90-FE9C-FB4E-A18A-9792DF813A96}" type="slidenum">
               <a:rPr lang="en-US" smtClean="0"/>
+              <a:pPr/>
               <a:t>‹#›</a:t>
             </a:fld>
             <a:endParaRPr lang="en-US"/>
@@ -3898,14 +3932,14 @@
           <a:lstStyle/>
           <a:p>
             <a:r>
-              <a:rPr lang="en-US" dirty="0" smtClean="0">
+              <a:rPr lang="en-US" b="1" dirty="0" smtClean="0">
                 <a:solidFill>
                   <a:srgbClr val="BFBFBF"/>
                 </a:solidFill>
               </a:rPr>
               <a:t>Features</a:t>
             </a:r>
-            <a:endParaRPr lang="en-US" dirty="0"/>
+            <a:endParaRPr lang="en-US" b="1" dirty="0"/>
           </a:p>
         </p:txBody>
       </p:sp>
@@ -4019,6 +4053,7 @@
           <a:p>
             <a:fld id="{43F1BE90-FE9C-FB4E-A18A-9792DF813A96}" type="slidenum">
               <a:rPr lang="en-US" smtClean="0"/>
+              <a:pPr/>
               <a:t>11</a:t>
             </a:fld>
             <a:endParaRPr lang="en-US"/>
@@ -4066,14 +4101,14 @@
           <a:lstStyle/>
           <a:p>
             <a:r>
-              <a:rPr lang="en-US" dirty="0" smtClean="0">
+              <a:rPr lang="en-US" b="1" dirty="0" smtClean="0">
                 <a:solidFill>
                   <a:srgbClr val="BFBFBF"/>
                 </a:solidFill>
               </a:rPr>
               <a:t>Features</a:t>
             </a:r>
-            <a:endParaRPr lang="en-US" dirty="0">
+            <a:endParaRPr lang="en-US" b="1" dirty="0">
               <a:solidFill>
                 <a:srgbClr val="BFBFBF"/>
               </a:solidFill>
@@ -4190,6 +4225,7 @@
           <a:p>
             <a:fld id="{43F1BE90-FE9C-FB4E-A18A-9792DF813A96}" type="slidenum">
               <a:rPr lang="en-US" smtClean="0"/>
+              <a:pPr/>
               <a:t>12</a:t>
             </a:fld>
             <a:endParaRPr lang="en-US"/>
@@ -4244,14 +4280,14 @@
           <a:lstStyle/>
           <a:p>
             <a:r>
-              <a:rPr lang="en-US" sz="4000" dirty="0" smtClean="0">
+              <a:rPr lang="en-US" sz="4000" b="1" dirty="0" smtClean="0">
                 <a:solidFill>
                   <a:srgbClr val="BFBFBF"/>
                 </a:solidFill>
               </a:rPr>
               <a:t>Feature Generation</a:t>
             </a:r>
-            <a:endParaRPr lang="en-US" sz="4000" dirty="0">
+            <a:endParaRPr lang="en-US" sz="4000" b="1" dirty="0">
               <a:solidFill>
                 <a:srgbClr val="BFBFBF"/>
               </a:solidFill>
@@ -4326,7 +4362,6 @@
               <a:rPr lang="en-US" dirty="0" smtClean="0"/>
               <a:t>Open &gt; Close more than 50% of the time</a:t>
             </a:r>
-            <a:endParaRPr lang="en-US" dirty="0" smtClean="0"/>
           </a:p>
           <a:p>
             <a:pPr lvl="1"/>
@@ -4341,7 +4376,6 @@
               <a:rPr lang="en-US" dirty="0" smtClean="0"/>
               <a:t>Price above 10ema more than 50% of days</a:t>
             </a:r>
-            <a:endParaRPr lang="en-US" dirty="0" smtClean="0"/>
           </a:p>
           <a:p>
             <a:pPr lvl="1"/>
@@ -4349,7 +4383,6 @@
               <a:rPr lang="en-US" dirty="0" smtClean="0"/>
               <a:t>Number of times price and volume went up &gt; 50%</a:t>
             </a:r>
-            <a:endParaRPr lang="en-US" dirty="0" smtClean="0"/>
           </a:p>
           <a:p>
             <a:pPr lvl="1"/>
@@ -4357,7 +4390,6 @@
               <a:rPr lang="en-US" dirty="0" smtClean="0"/>
               <a:t>Volume went up &gt; 50% of the time</a:t>
             </a:r>
-            <a:endParaRPr lang="en-US" dirty="0" smtClean="0"/>
           </a:p>
           <a:p>
             <a:pPr lvl="1"/>
@@ -4436,6 +4468,7 @@
           <a:p>
             <a:fld id="{43F1BE90-FE9C-FB4E-A18A-9792DF813A96}" type="slidenum">
               <a:rPr lang="en-US" smtClean="0"/>
+              <a:pPr/>
               <a:t>13</a:t>
             </a:fld>
             <a:endParaRPr lang="en-US"/>
@@ -4485,14 +4518,14 @@
           <a:lstStyle/>
           <a:p>
             <a:r>
-              <a:rPr lang="en-US" sz="4000" dirty="0" smtClean="0">
+              <a:rPr lang="en-US" sz="4000" b="1" dirty="0" smtClean="0">
                 <a:solidFill>
                   <a:srgbClr val="BFBFBF"/>
                 </a:solidFill>
               </a:rPr>
               <a:t>Features Generation</a:t>
             </a:r>
-            <a:endParaRPr lang="en-US" sz="4000" dirty="0">
+            <a:endParaRPr lang="en-US" sz="4000" b="1" dirty="0">
               <a:solidFill>
                 <a:srgbClr val="BFBFBF"/>
               </a:solidFill>
@@ -4654,6 +4687,7 @@
           <a:p>
             <a:fld id="{43F1BE90-FE9C-FB4E-A18A-9792DF813A96}" type="slidenum">
               <a:rPr lang="en-US" smtClean="0"/>
+              <a:pPr/>
               <a:t>14</a:t>
             </a:fld>
             <a:endParaRPr lang="en-US"/>
@@ -4703,7 +4737,7 @@
           <a:lstStyle/>
           <a:p>
             <a:r>
-              <a:rPr lang="en-US" sz="4000" dirty="0" smtClean="0">
+              <a:rPr lang="en-US" sz="4000" b="1" dirty="0" smtClean="0">
                 <a:solidFill>
                   <a:schemeClr val="bg1">
                     <a:lumMod val="75000"/>
@@ -4712,7 +4746,7 @@
               </a:rPr>
               <a:t>Features Code</a:t>
             </a:r>
-            <a:endParaRPr lang="en-US" sz="4000" dirty="0">
+            <a:endParaRPr lang="en-US" sz="4000" b="1" dirty="0">
               <a:solidFill>
                 <a:schemeClr val="bg1">
                   <a:lumMod val="75000"/>
@@ -4722,9 +4756,61 @@
           </a:p>
         </p:txBody>
       </p:sp>
+      <p:sp>
+        <p:nvSpPr>
+          <p:cNvPr id="4" name="Footer Placeholder 3"/>
+          <p:cNvSpPr>
+            <a:spLocks noGrp="1"/>
+          </p:cNvSpPr>
+          <p:nvPr>
+            <p:ph type="ftr" sz="quarter" idx="11"/>
+          </p:nvPr>
+        </p:nvSpPr>
+        <p:spPr/>
+        <p:txBody>
+          <a:bodyPr/>
+          <a:lstStyle/>
+          <a:p>
+            <a:endParaRPr lang="en-US" dirty="0" smtClean="0"/>
+          </a:p>
+          <a:p>
+            <a:r>
+              <a:rPr lang="en-US" dirty="0" smtClean="0"/>
+              <a:t>EE6893 Big Data Analytics</a:t>
+            </a:r>
+          </a:p>
+          <a:p>
+            <a:endParaRPr lang="en-US" dirty="0"/>
+          </a:p>
+        </p:txBody>
+      </p:sp>
+      <p:sp>
+        <p:nvSpPr>
+          <p:cNvPr id="5" name="Slide Number Placeholder 4"/>
+          <p:cNvSpPr>
+            <a:spLocks noGrp="1"/>
+          </p:cNvSpPr>
+          <p:nvPr>
+            <p:ph type="sldNum" sz="quarter" idx="12"/>
+          </p:nvPr>
+        </p:nvSpPr>
+        <p:spPr/>
+        <p:txBody>
+          <a:bodyPr/>
+          <a:lstStyle/>
+          <a:p>
+            <a:fld id="{43F1BE90-FE9C-FB4E-A18A-9792DF813A96}" type="slidenum">
+              <a:rPr lang="en-US" smtClean="0"/>
+              <a:pPr/>
+              <a:t>15</a:t>
+            </a:fld>
+            <a:endParaRPr lang="en-US" dirty="0"/>
+          </a:p>
+        </p:txBody>
+      </p:sp>
       <p:pic>
         <p:nvPicPr>
-          <p:cNvPr id="6" name="Content Placeholder 5" descr="Screenshot 2015-12-15 23.44.46.png"/>
+          <p:cNvPr id="9" name="Content Placeholder 8" descr="Screenshot 2015-12-17 19.43.09.png"/>
           <p:cNvPicPr>
             <a:picLocks noGrp="1" noChangeAspect="1"/>
           </p:cNvPicPr>
@@ -4734,64 +4820,13 @@
         </p:nvPicPr>
         <p:blipFill>
           <a:blip r:embed="rId2"/>
-          <a:srcRect l="-1005" r="-1005"/>
+          <a:srcRect l="-10875" r="-10875"/>
           <a:stretch>
             <a:fillRect/>
           </a:stretch>
         </p:blipFill>
         <p:spPr/>
       </p:pic>
-      <p:sp>
-        <p:nvSpPr>
-          <p:cNvPr id="4" name="Footer Placeholder 3"/>
-          <p:cNvSpPr>
-            <a:spLocks noGrp="1"/>
-          </p:cNvSpPr>
-          <p:nvPr>
-            <p:ph type="ftr" sz="quarter" idx="11"/>
-          </p:nvPr>
-        </p:nvSpPr>
-        <p:spPr/>
-        <p:txBody>
-          <a:bodyPr/>
-          <a:lstStyle/>
-          <a:p>
-            <a:endParaRPr lang="en-US" dirty="0" smtClean="0"/>
-          </a:p>
-          <a:p>
-            <a:r>
-              <a:rPr lang="en-US" dirty="0" smtClean="0"/>
-              <a:t>EE6893 Big Data Analytics</a:t>
-            </a:r>
-          </a:p>
-          <a:p>
-            <a:endParaRPr lang="en-US" dirty="0"/>
-          </a:p>
-        </p:txBody>
-      </p:sp>
-      <p:sp>
-        <p:nvSpPr>
-          <p:cNvPr id="5" name="Slide Number Placeholder 4"/>
-          <p:cNvSpPr>
-            <a:spLocks noGrp="1"/>
-          </p:cNvSpPr>
-          <p:nvPr>
-            <p:ph type="sldNum" sz="quarter" idx="12"/>
-          </p:nvPr>
-        </p:nvSpPr>
-        <p:spPr/>
-        <p:txBody>
-          <a:bodyPr/>
-          <a:lstStyle/>
-          <a:p>
-            <a:fld id="{43F1BE90-FE9C-FB4E-A18A-9792DF813A96}" type="slidenum">
-              <a:rPr lang="en-US" smtClean="0"/>
-              <a:t>15</a:t>
-            </a:fld>
-            <a:endParaRPr lang="en-US"/>
-          </a:p>
-        </p:txBody>
-      </p:sp>
     </p:spTree>
   </p:cSld>
   <p:clrMapOvr>
@@ -4833,14 +4868,14 @@
           <a:lstStyle/>
           <a:p>
             <a:r>
-              <a:rPr lang="en-US" dirty="0" smtClean="0">
+              <a:rPr lang="en-US" b="1" dirty="0" smtClean="0">
                 <a:solidFill>
                   <a:srgbClr val="BFBFBF"/>
                 </a:solidFill>
               </a:rPr>
               <a:t>Model Training</a:t>
             </a:r>
-            <a:endParaRPr lang="en-US" dirty="0">
+            <a:endParaRPr lang="en-US" b="1" dirty="0">
               <a:solidFill>
                 <a:srgbClr val="BFBFBF"/>
               </a:solidFill>
@@ -4934,11 +4969,7 @@
             <a:pPr lvl="1"/>
             <a:r>
               <a:rPr lang="en-US" dirty="0" smtClean="0"/>
-              <a:t>Good: </a:t>
-            </a:r>
-            <a:r>
-              <a:rPr lang="en-US" dirty="0" smtClean="0"/>
-              <a:t>Scales and is fast</a:t>
+              <a:t>Good: Scales and is fast</a:t>
             </a:r>
           </a:p>
           <a:p>
@@ -4952,13 +4983,8 @@
             <a:pPr lvl="1"/>
             <a:r>
               <a:rPr lang="en-US" dirty="0" smtClean="0"/>
-              <a:t>Bad: Better at modeling </a:t>
-            </a:r>
-            <a:r>
-              <a:rPr lang="en-US" dirty="0" smtClean="0"/>
-              <a:t>data where there’s a single decision boundary</a:t>
-            </a:r>
-            <a:endParaRPr lang="en-US" dirty="0" smtClean="0"/>
+              <a:t>Bad: Better at modeling data where there’s a single decision boundary</a:t>
+            </a:r>
           </a:p>
           <a:p>
             <a:pPr lvl="1"/>
@@ -5011,6 +5037,7 @@
           <a:p>
             <a:fld id="{43F1BE90-FE9C-FB4E-A18A-9792DF813A96}" type="slidenum">
               <a:rPr lang="en-US" smtClean="0"/>
+              <a:pPr/>
               <a:t>16</a:t>
             </a:fld>
             <a:endParaRPr lang="en-US"/>
@@ -5058,7 +5085,7 @@
           <a:lstStyle/>
           <a:p>
             <a:r>
-              <a:rPr lang="en-US" dirty="0" smtClean="0">
+              <a:rPr lang="en-US" b="1" dirty="0" smtClean="0">
                 <a:solidFill>
                   <a:srgbClr val="BFBFBF"/>
                 </a:solidFill>
@@ -5071,7 +5098,7 @@
       </p:sp>
       <p:pic>
         <p:nvPicPr>
-          <p:cNvPr id="6" name="Content Placeholder 5" descr="Screenshot 2015-12-16 00.46.56.png"/>
+          <p:cNvPr id="6" name="Content Placeholder 5" descr="Screenshot 2015-12-17 19.37.05.png"/>
           <p:cNvPicPr>
             <a:picLocks noGrp="1" noChangeAspect="1"/>
           </p:cNvPicPr>
@@ -5081,24 +5108,12 @@
         </p:nvPicPr>
         <p:blipFill>
           <a:blip r:embed="rId2"/>
-          <a:srcRect t="-86923" b="-86923"/>
+          <a:srcRect t="-3080" b="-3080"/>
           <a:stretch>
             <a:fillRect/>
           </a:stretch>
         </p:blipFill>
-        <p:spPr>
-          <a:xfrm>
-            <a:off x="520699" y="274638"/>
-            <a:ext cx="8229600" cy="4236714"/>
-          </a:xfrm>
-          <a:effectLst>
-            <a:outerShdw blurRad="50800" dist="38100" dir="8100000" algn="bl">
-              <a:srgbClr val="000000">
-                <a:alpha val="43000"/>
-              </a:srgbClr>
-            </a:outerShdw>
-          </a:effectLst>
-        </p:spPr>
+        <p:spPr/>
       </p:pic>
       <p:sp>
         <p:nvSpPr>
@@ -5120,7 +5135,11 @@
           <a:p>
             <a:r>
               <a:rPr lang="en-US" dirty="0" smtClean="0"/>
-              <a:t>EE6893 Big Data Analytics</a:t>
+              <a:t>EE6893 </a:t>
+            </a:r>
+            <a:r>
+              <a:rPr lang="en-US" dirty="0" smtClean="0"/>
+              <a:t>Big Data Analytics</a:t>
             </a:r>
           </a:p>
           <a:p>
@@ -5145,43 +5164,13 @@
           <a:p>
             <a:fld id="{43F1BE90-FE9C-FB4E-A18A-9792DF813A96}" type="slidenum">
               <a:rPr lang="en-US" smtClean="0"/>
+              <a:pPr/>
               <a:t>17</a:t>
             </a:fld>
             <a:endParaRPr lang="en-US"/>
           </a:p>
         </p:txBody>
       </p:sp>
-      <p:pic>
-        <p:nvPicPr>
-          <p:cNvPr id="7" name="Picture 6" descr="Screenshot 2015-12-16 00.47.18.png"/>
-          <p:cNvPicPr>
-            <a:picLocks noChangeAspect="1"/>
-          </p:cNvPicPr>
-          <p:nvPr/>
-        </p:nvPicPr>
-        <p:blipFill>
-          <a:blip r:embed="rId3"/>
-          <a:stretch>
-            <a:fillRect/>
-          </a:stretch>
-        </p:blipFill>
-        <p:spPr>
-          <a:xfrm>
-            <a:off x="520699" y="3751965"/>
-            <a:ext cx="8166101" cy="1546505"/>
-          </a:xfrm>
-          <a:prstGeom prst="rect">
-            <a:avLst/>
-          </a:prstGeom>
-          <a:effectLst>
-            <a:outerShdw blurRad="50800" dist="38100" dir="8100000" algn="bl">
-              <a:srgbClr val="000000">
-                <a:alpha val="43000"/>
-              </a:srgbClr>
-            </a:outerShdw>
-          </a:effectLst>
-        </p:spPr>
-      </p:pic>
     </p:spTree>
   </p:cSld>
   <p:clrMapOvr>
@@ -5228,7 +5217,7 @@
           <a:lstStyle/>
           <a:p>
             <a:r>
-              <a:rPr lang="en-US" dirty="0" smtClean="0">
+              <a:rPr lang="en-US" b="1" dirty="0" smtClean="0">
                 <a:solidFill>
                   <a:schemeClr val="bg1">
                     <a:lumMod val="75000"/>
@@ -5237,7 +5226,7 @@
               </a:rPr>
               <a:t>Model Evaluation</a:t>
             </a:r>
-            <a:endParaRPr lang="en-US" dirty="0">
+            <a:endParaRPr lang="en-US" b="1" dirty="0">
               <a:solidFill>
                 <a:schemeClr val="bg1">
                   <a:lumMod val="75000"/>
@@ -5273,8 +5262,29 @@
                   <a:schemeClr val="accent1"/>
                 </a:solidFill>
               </a:rPr>
-              <a:t>80% of data used for training the model</a:t>
-            </a:r>
+              <a:t>6</a:t>
+            </a:r>
+            <a:r>
+              <a:rPr lang="en-US" dirty="0" smtClean="0">
+                <a:solidFill>
+                  <a:schemeClr val="accent1"/>
+                </a:solidFill>
+              </a:rPr>
+              <a:t>0</a:t>
+            </a:r>
+            <a:r>
+              <a:rPr lang="en-US" dirty="0" smtClean="0">
+                <a:solidFill>
+                  <a:schemeClr val="accent1"/>
+                </a:solidFill>
+              </a:rPr>
+              <a:t>% of data used for training the model</a:t>
+            </a:r>
+            <a:endParaRPr lang="en-US" dirty="0" smtClean="0">
+              <a:solidFill>
+                <a:schemeClr val="accent1"/>
+              </a:solidFill>
+            </a:endParaRPr>
           </a:p>
           <a:p>
             <a:r>
@@ -5283,7 +5293,23 @@
                   <a:srgbClr val="4F81BD"/>
                 </a:solidFill>
               </a:rPr>
-              <a:t>20% used for evaluation</a:t>
+              <a:t>4</a:t>
+            </a:r>
+            <a:r>
+              <a:rPr lang="en-US" dirty="0" smtClean="0">
+                <a:solidFill>
+                  <a:srgbClr val="4F81BD"/>
+                </a:solidFill>
+              </a:rPr>
+              <a:t>0</a:t>
+            </a:r>
+            <a:r>
+              <a:rPr lang="en-US" dirty="0" smtClean="0">
+                <a:solidFill>
+                  <a:srgbClr val="4F81BD"/>
+                </a:solidFill>
+              </a:rPr>
+              <a:t>% used for evaluation</a:t>
             </a:r>
           </a:p>
           <a:p>
@@ -5348,6 +5374,7 @@
           <a:p>
             <a:fld id="{43F1BE90-FE9C-FB4E-A18A-9792DF813A96}" type="slidenum">
               <a:rPr lang="en-US" smtClean="0"/>
+              <a:pPr/>
               <a:t>18</a:t>
             </a:fld>
             <a:endParaRPr lang="en-US"/>
@@ -5356,7 +5383,7 @@
       </p:sp>
       <p:pic>
         <p:nvPicPr>
-          <p:cNvPr id="6" name="Picture 5" descr="Screenshot 2015-12-16 00.53.16.png"/>
+          <p:cNvPr id="8" name="Picture 7" descr="Screenshot 2015-12-17 19.40.35.png"/>
           <p:cNvPicPr>
             <a:picLocks noChangeAspect="1"/>
           </p:cNvPicPr>
@@ -5370,8 +5397,8 @@
         </p:blipFill>
         <p:spPr>
           <a:xfrm>
-            <a:off x="457200" y="3358475"/>
-            <a:ext cx="8089499" cy="2767688"/>
+            <a:off x="457200" y="3181350"/>
+            <a:ext cx="7988300" cy="3175000"/>
           </a:xfrm>
           <a:prstGeom prst="rect">
             <a:avLst/>
@@ -5419,7 +5446,7 @@
           <a:lstStyle/>
           <a:p>
             <a:r>
-              <a:rPr lang="en-US" dirty="0" smtClean="0">
+              <a:rPr lang="en-US" b="1" dirty="0" smtClean="0">
                 <a:solidFill>
                   <a:schemeClr val="bg1">
                     <a:lumMod val="75000"/>
@@ -5428,7 +5455,7 @@
               </a:rPr>
               <a:t>Model Evaluation</a:t>
             </a:r>
-            <a:endParaRPr lang="en-US" dirty="0"/>
+            <a:endParaRPr lang="en-US" b="1" dirty="0"/>
           </a:p>
         </p:txBody>
       </p:sp>
@@ -5453,21 +5480,25 @@
                   <a:schemeClr val="accent1"/>
                 </a:solidFill>
               </a:rPr>
-              <a:t>Precision</a:t>
+              <a:t>Accuracy</a:t>
             </a:r>
           </a:p>
           <a:p>
             <a:pPr lvl="1"/>
             <a:r>
               <a:rPr lang="en-US" dirty="0" smtClean="0"/>
-              <a:t>How often does our model have false positives?</a:t>
+              <a:t>How often</a:t>
+            </a:r>
+            <a:r>
+              <a:rPr lang="en-US" dirty="0" smtClean="0"/>
+              <a:t> are we correct?</a:t>
             </a:r>
           </a:p>
           <a:p>
             <a:pPr lvl="1"/>
             <a:r>
               <a:rPr lang="en-US" b="1" dirty="0" smtClean="0"/>
-              <a:t>True positives </a:t>
+              <a:t># correct </a:t>
             </a:r>
             <a:r>
               <a:rPr lang="en-US" dirty="0" smtClean="0"/>
@@ -5475,83 +5506,67 @@
             </a:r>
             <a:r>
               <a:rPr lang="en-US" b="1" dirty="0" smtClean="0"/>
-              <a:t># predicted positive</a:t>
+              <a:t>Total Examples</a:t>
             </a:r>
           </a:p>
           <a:p>
             <a:pPr lvl="1"/>
             <a:r>
-              <a:rPr lang="en-US" b="1" dirty="0" smtClean="0"/>
-              <a:t>True positives </a:t>
-            </a:r>
-            <a:r>
-              <a:rPr lang="en-US" dirty="0" smtClean="0"/>
-              <a:t>/ (</a:t>
-            </a:r>
-            <a:r>
-              <a:rPr lang="en-US" b="1" dirty="0" smtClean="0"/>
-              <a:t>True positive </a:t>
-            </a:r>
-            <a:r>
-              <a:rPr lang="en-US" dirty="0" smtClean="0"/>
-              <a:t>+ </a:t>
-            </a:r>
-            <a:r>
-              <a:rPr lang="en-US" b="1" dirty="0" smtClean="0"/>
-              <a:t>False positive</a:t>
-            </a:r>
-            <a:r>
-              <a:rPr lang="en-US" dirty="0" smtClean="0"/>
-              <a:t>)</a:t>
+              <a:rPr lang="en-US" dirty="0" smtClean="0"/>
+              <a:t>Problem: sensitive to imbalance classes! A simple predictor predicting only one class can do well based on this metric</a:t>
             </a:r>
           </a:p>
           <a:p>
             <a:pPr lvl="1"/>
-            <a:r>
-              <a:rPr lang="en-US" dirty="0" smtClean="0"/>
-              <a:t>Higher is better (closer to 1)</a:t>
-            </a:r>
-          </a:p>
-          <a:p>
-            <a:pPr lvl="1"/>
-            <a:r>
-              <a:rPr lang="en-US" dirty="0" smtClean="0"/>
-              <a:t>Higher precision means false positive are closer to zero.</a:t>
-            </a:r>
+            <a:endParaRPr lang="en-US" b="1" dirty="0" smtClean="0">
+              <a:solidFill>
+                <a:schemeClr val="accent1"/>
+              </a:solidFill>
+            </a:endParaRPr>
+          </a:p>
+          <a:p>
+            <a:endParaRPr lang="en-US" b="1" dirty="0" smtClean="0">
+              <a:solidFill>
+                <a:schemeClr val="accent1"/>
+              </a:solidFill>
+            </a:endParaRPr>
+          </a:p>
+        </p:txBody>
+      </p:sp>
+      <p:sp>
+        <p:nvSpPr>
+          <p:cNvPr id="4" name="Footer Placeholder 3"/>
+          <p:cNvSpPr>
+            <a:spLocks noGrp="1"/>
+          </p:cNvSpPr>
+          <p:nvPr>
+            <p:ph type="ftr" sz="quarter" idx="11"/>
+          </p:nvPr>
+        </p:nvSpPr>
+        <p:spPr/>
+        <p:txBody>
+          <a:bodyPr/>
+          <a:lstStyle/>
+          <a:p>
+            <a:endParaRPr lang="en-US" dirty="0" smtClean="0"/>
+          </a:p>
+          <a:p>
+            <a:r>
+              <a:rPr lang="en-US" dirty="0" smtClean="0"/>
+              <a:t>EE6893 </a:t>
+            </a:r>
+            <a:r>
+              <a:rPr lang="en-US" dirty="0" smtClean="0"/>
+              <a:t>Big Data Analytics</a:t>
+            </a:r>
+          </a:p>
+          <a:p>
             <a:endParaRPr lang="en-US" dirty="0"/>
           </a:p>
         </p:txBody>
       </p:sp>
       <p:sp>
         <p:nvSpPr>
-          <p:cNvPr id="4" name="Footer Placeholder 3"/>
-          <p:cNvSpPr>
-            <a:spLocks noGrp="1"/>
-          </p:cNvSpPr>
-          <p:nvPr>
-            <p:ph type="ftr" sz="quarter" idx="11"/>
-          </p:nvPr>
-        </p:nvSpPr>
-        <p:spPr/>
-        <p:txBody>
-          <a:bodyPr/>
-          <a:lstStyle/>
-          <a:p>
-            <a:endParaRPr lang="en-US" dirty="0" smtClean="0"/>
-          </a:p>
-          <a:p>
-            <a:r>
-              <a:rPr lang="en-US" dirty="0" smtClean="0"/>
-              <a:t>EE6893 Big Data Analytics</a:t>
-            </a:r>
-          </a:p>
-          <a:p>
-            <a:endParaRPr lang="en-US" dirty="0"/>
-          </a:p>
-        </p:txBody>
-      </p:sp>
-      <p:sp>
-        <p:nvSpPr>
           <p:cNvPr id="5" name="Slide Number Placeholder 4"/>
           <p:cNvSpPr>
             <a:spLocks noGrp="1"/>
@@ -5567,6 +5582,7 @@
           <a:p>
             <a:fld id="{43F1BE90-FE9C-FB4E-A18A-9792DF813A96}" type="slidenum">
               <a:rPr lang="en-US" smtClean="0"/>
+              <a:pPr/>
               <a:t>19</a:t>
             </a:fld>
             <a:endParaRPr lang="en-US"/>
@@ -5614,7 +5630,7 @@
           <a:lstStyle/>
           <a:p>
             <a:r>
-              <a:rPr lang="en-US" dirty="0" smtClean="0">
+              <a:rPr lang="en-US" b="1" dirty="0" smtClean="0">
                 <a:solidFill>
                   <a:schemeClr val="bg1">
                     <a:lumMod val="75000"/>
@@ -5623,7 +5639,7 @@
               </a:rPr>
               <a:t>Model Evaluation</a:t>
             </a:r>
-            <a:endParaRPr lang="en-US" dirty="0"/>
+            <a:endParaRPr lang="en-US" b="1" dirty="0"/>
           </a:p>
         </p:txBody>
       </p:sp>
@@ -5645,24 +5661,17 @@
             <a:r>
               <a:rPr lang="en-US" b="1" dirty="0" smtClean="0">
                 <a:solidFill>
-                  <a:srgbClr val="4F81BD"/>
+                  <a:schemeClr val="accent1"/>
                 </a:solidFill>
               </a:rPr>
-              <a:t>Recall</a:t>
+              <a:t>Precision</a:t>
             </a:r>
           </a:p>
           <a:p>
             <a:pPr lvl="1"/>
             <a:r>
               <a:rPr lang="en-US" dirty="0" smtClean="0"/>
-              <a:t>How sensitive is our model?</a:t>
-            </a:r>
-          </a:p>
-          <a:p>
-            <a:pPr lvl="1"/>
-            <a:r>
-              <a:rPr lang="en-US" dirty="0" smtClean="0"/>
-              <a:t>Of all the actual beats, what fraction did we predict correctly?</a:t>
+              <a:t>How often does our model have false positives?</a:t>
             </a:r>
           </a:p>
           <a:p>
@@ -5677,7 +5686,7 @@
             </a:r>
             <a:r>
               <a:rPr lang="en-US" b="1" dirty="0" smtClean="0"/>
-              <a:t># actual positives</a:t>
+              <a:t># predicted positive</a:t>
             </a:r>
           </a:p>
           <a:p>
@@ -5688,25 +5697,37 @@
             </a:r>
             <a:r>
               <a:rPr lang="en-US" dirty="0" smtClean="0"/>
-              <a:t>/ </a:t>
+              <a:t>/ (</a:t>
             </a:r>
             <a:r>
               <a:rPr lang="en-US" b="1" dirty="0" smtClean="0"/>
-              <a:t>(True positive + False negative)</a:t>
+              <a:t>True positive </a:t>
+            </a:r>
+            <a:r>
+              <a:rPr lang="en-US" dirty="0" smtClean="0"/>
+              <a:t>+ </a:t>
+            </a:r>
+            <a:r>
+              <a:rPr lang="en-US" b="1" dirty="0" smtClean="0"/>
+              <a:t>False positive</a:t>
+            </a:r>
+            <a:r>
+              <a:rPr lang="en-US" dirty="0" smtClean="0"/>
+              <a:t>)</a:t>
             </a:r>
           </a:p>
           <a:p>
             <a:pPr lvl="1"/>
             <a:r>
               <a:rPr lang="en-US" dirty="0" smtClean="0"/>
-              <a:t>Higher is better (close to 1)</a:t>
+              <a:t>Higher is better (closer to 1)</a:t>
             </a:r>
           </a:p>
           <a:p>
             <a:pPr lvl="1"/>
             <a:r>
               <a:rPr lang="en-US" dirty="0" smtClean="0"/>
-              <a:t>This means that “False Negatives” are close to 0</a:t>
+              <a:t>Higher precision means false positive are closer to zero.</a:t>
             </a:r>
             <a:endParaRPr lang="en-US" dirty="0"/>
           </a:p>
@@ -5757,6 +5778,7 @@
           <a:p>
             <a:fld id="{43F1BE90-FE9C-FB4E-A18A-9792DF813A96}" type="slidenum">
               <a:rPr lang="en-US" smtClean="0"/>
+              <a:pPr/>
               <a:t>20</a:t>
             </a:fld>
             <a:endParaRPr lang="en-US"/>
@@ -5811,14 +5833,14 @@
           <a:lstStyle/>
           <a:p>
             <a:r>
-              <a:rPr lang="en-US" dirty="0" smtClean="0">
+              <a:rPr lang="en-US" b="1" dirty="0" smtClean="0">
                 <a:solidFill>
                   <a:srgbClr val="A6A6A6"/>
                 </a:solidFill>
               </a:rPr>
               <a:t>Overview</a:t>
             </a:r>
-            <a:endParaRPr lang="en-US" dirty="0">
+            <a:endParaRPr lang="en-US" b="1" dirty="0">
               <a:solidFill>
                 <a:srgbClr val="A6A6A6"/>
               </a:solidFill>
@@ -5877,16 +5899,7 @@
                 <a:cs typeface="Helvetica" pitchFamily="-112" charset="0"/>
                 <a:sym typeface="Helvetica" pitchFamily="-112" charset="0"/>
               </a:rPr>
-              <a:t>Using Machine </a:t>
-            </a:r>
-            <a:r>
-              <a:rPr lang="en-US" sz="2400" dirty="0" smtClean="0">
-                <a:latin typeface="Helvetica" pitchFamily="-112" charset="0"/>
-                <a:ea typeface="Helvetica" pitchFamily="-112" charset="0"/>
-                <a:cs typeface="Helvetica" pitchFamily="-112" charset="0"/>
-                <a:sym typeface="Helvetica" pitchFamily="-112" charset="0"/>
-              </a:rPr>
-              <a:t>Learning, we want to build a model to</a:t>
+              <a:t>Using Machine Learning, we want to build a model to</a:t>
             </a:r>
           </a:p>
           <a:p>
@@ -6063,6 +6076,7 @@
           <a:p>
             <a:fld id="{43F1BE90-FE9C-FB4E-A18A-9792DF813A96}" type="slidenum">
               <a:rPr lang="en-US" smtClean="0"/>
+              <a:pPr/>
               <a:t>3</a:t>
             </a:fld>
             <a:endParaRPr lang="en-US"/>
@@ -6133,18 +6147,16 @@
           <a:lstStyle/>
           <a:p>
             <a:r>
-              <a:rPr lang="en-US" dirty="0" smtClean="0">
+              <a:rPr lang="en-US" b="1" dirty="0" smtClean="0">
                 <a:solidFill>
-                  <a:srgbClr val="BFBFBF"/>
+                  <a:schemeClr val="bg1">
+                    <a:lumMod val="75000"/>
+                  </a:schemeClr>
                 </a:solidFill>
               </a:rPr>
               <a:t>Model Evaluation</a:t>
             </a:r>
-            <a:endParaRPr lang="en-US" dirty="0">
-              <a:solidFill>
-                <a:srgbClr val="BFBFBF"/>
-              </a:solidFill>
-            </a:endParaRPr>
+            <a:endParaRPr lang="en-US" b="1" dirty="0"/>
           </a:p>
         </p:txBody>
       </p:sp>
@@ -6163,22 +6175,72 @@
           <a:bodyPr/>
           <a:lstStyle/>
           <a:p>
-            <a:pPr>
-              <a:buNone/>
-            </a:pPr>
             <a:r>
               <a:rPr lang="en-US" b="1" dirty="0" smtClean="0">
                 <a:solidFill>
-                  <a:schemeClr val="accent1"/>
+                  <a:srgbClr val="4F81BD"/>
                 </a:solidFill>
               </a:rPr>
-              <a:t>Results</a:t>
-            </a:r>
-          </a:p>
-          <a:p>
-            <a:pPr>
-              <a:buNone/>
-            </a:pPr>
+              <a:t>Recall</a:t>
+            </a:r>
+          </a:p>
+          <a:p>
+            <a:pPr lvl="1"/>
+            <a:r>
+              <a:rPr lang="en-US" dirty="0" smtClean="0"/>
+              <a:t>How sensitive is our model?</a:t>
+            </a:r>
+          </a:p>
+          <a:p>
+            <a:pPr lvl="1"/>
+            <a:r>
+              <a:rPr lang="en-US" dirty="0" smtClean="0"/>
+              <a:t>Of all the actual beats, what fraction did we predict correctly?</a:t>
+            </a:r>
+          </a:p>
+          <a:p>
+            <a:pPr lvl="1"/>
+            <a:r>
+              <a:rPr lang="en-US" b="1" dirty="0" smtClean="0"/>
+              <a:t>True positives </a:t>
+            </a:r>
+            <a:r>
+              <a:rPr lang="en-US" dirty="0" smtClean="0"/>
+              <a:t>/ </a:t>
+            </a:r>
+            <a:r>
+              <a:rPr lang="en-US" b="1" dirty="0" smtClean="0"/>
+              <a:t># actual positives</a:t>
+            </a:r>
+          </a:p>
+          <a:p>
+            <a:pPr lvl="1"/>
+            <a:r>
+              <a:rPr lang="en-US" b="1" dirty="0" smtClean="0"/>
+              <a:t>True positives </a:t>
+            </a:r>
+            <a:r>
+              <a:rPr lang="en-US" dirty="0" smtClean="0"/>
+              <a:t>/ </a:t>
+            </a:r>
+            <a:r>
+              <a:rPr lang="en-US" b="1" dirty="0" smtClean="0"/>
+              <a:t>(True positive + False negative)</a:t>
+            </a:r>
+          </a:p>
+          <a:p>
+            <a:pPr lvl="1"/>
+            <a:r>
+              <a:rPr lang="en-US" dirty="0" smtClean="0"/>
+              <a:t>Higher is better (close to 1)</a:t>
+            </a:r>
+          </a:p>
+          <a:p>
+            <a:pPr lvl="1"/>
+            <a:r>
+              <a:rPr lang="en-US" dirty="0" smtClean="0"/>
+              <a:t>This means that “False Negatives” are close to 0</a:t>
+            </a:r>
             <a:endParaRPr lang="en-US" dirty="0"/>
           </a:p>
         </p:txBody>
@@ -6228,36 +6290,13 @@
           <a:p>
             <a:fld id="{43F1BE90-FE9C-FB4E-A18A-9792DF813A96}" type="slidenum">
               <a:rPr lang="en-US" smtClean="0"/>
+              <a:pPr/>
               <a:t>21</a:t>
             </a:fld>
             <a:endParaRPr lang="en-US"/>
           </a:p>
         </p:txBody>
       </p:sp>
-      <p:pic>
-        <p:nvPicPr>
-          <p:cNvPr id="6" name="Picture 5" descr="Screenshot 2015-12-16 01.00.53.png"/>
-          <p:cNvPicPr>
-            <a:picLocks noChangeAspect="1"/>
-          </p:cNvPicPr>
-          <p:nvPr/>
-        </p:nvPicPr>
-        <p:blipFill>
-          <a:blip r:embed="rId2"/>
-          <a:stretch>
-            <a:fillRect/>
-          </a:stretch>
-        </p:blipFill>
-        <p:spPr>
-          <a:xfrm>
-            <a:off x="457200" y="2288020"/>
-            <a:ext cx="8382000" cy="3674404"/>
-          </a:xfrm>
-          <a:prstGeom prst="rect">
-            <a:avLst/>
-          </a:prstGeom>
-        </p:spPr>
-      </p:pic>
     </p:spTree>
   </p:cSld>
   <p:clrMapOvr>
@@ -6299,229 +6338,471 @@
           <a:lstStyle/>
           <a:p>
             <a:r>
-              <a:rPr lang="en-US" dirty="0" smtClean="0">
+              <a:rPr lang="en-US" b="1" dirty="0" smtClean="0">
+                <a:solidFill>
+                  <a:srgbClr val="BFBFBF"/>
+                </a:solidFill>
+              </a:rPr>
+              <a:t>Model Evaluation</a:t>
+            </a:r>
+            <a:endParaRPr lang="en-US" b="1" dirty="0">
+              <a:solidFill>
+                <a:srgbClr val="BFBFBF"/>
+              </a:solidFill>
+            </a:endParaRPr>
+          </a:p>
+        </p:txBody>
+      </p:sp>
+      <p:sp>
+        <p:nvSpPr>
+          <p:cNvPr id="3" name="Content Placeholder 2"/>
+          <p:cNvSpPr>
+            <a:spLocks noGrp="1"/>
+          </p:cNvSpPr>
+          <p:nvPr>
+            <p:ph idx="1"/>
+          </p:nvPr>
+        </p:nvSpPr>
+        <p:spPr/>
+        <p:txBody>
+          <a:bodyPr/>
+          <a:lstStyle/>
+          <a:p>
+            <a:pPr>
+              <a:buNone/>
+            </a:pPr>
+            <a:r>
+              <a:rPr lang="en-US" b="1" dirty="0" smtClean="0">
+                <a:solidFill>
+                  <a:schemeClr val="accent1"/>
+                </a:solidFill>
+              </a:rPr>
+              <a:t>Results &amp; Discussion</a:t>
+            </a:r>
+          </a:p>
+          <a:p>
+            <a:pPr>
+              <a:buNone/>
+            </a:pPr>
+            <a:endParaRPr lang="en-US" dirty="0"/>
+          </a:p>
+        </p:txBody>
+      </p:sp>
+      <p:sp>
+        <p:nvSpPr>
+          <p:cNvPr id="4" name="Footer Placeholder 3"/>
+          <p:cNvSpPr>
+            <a:spLocks noGrp="1"/>
+          </p:cNvSpPr>
+          <p:nvPr>
+            <p:ph type="ftr" sz="quarter" idx="11"/>
+          </p:nvPr>
+        </p:nvSpPr>
+        <p:spPr/>
+        <p:txBody>
+          <a:bodyPr/>
+          <a:lstStyle/>
+          <a:p>
+            <a:endParaRPr lang="en-US" dirty="0" smtClean="0"/>
+          </a:p>
+          <a:p>
+            <a:r>
+              <a:rPr lang="en-US" dirty="0" smtClean="0"/>
+              <a:t>EE6893 Big Data Analytics</a:t>
+            </a:r>
+          </a:p>
+          <a:p>
+            <a:endParaRPr lang="en-US" dirty="0"/>
+          </a:p>
+        </p:txBody>
+      </p:sp>
+      <p:sp>
+        <p:nvSpPr>
+          <p:cNvPr id="5" name="Slide Number Placeholder 4"/>
+          <p:cNvSpPr>
+            <a:spLocks noGrp="1"/>
+          </p:cNvSpPr>
+          <p:nvPr>
+            <p:ph type="sldNum" sz="quarter" idx="12"/>
+          </p:nvPr>
+        </p:nvSpPr>
+        <p:spPr/>
+        <p:txBody>
+          <a:bodyPr/>
+          <a:lstStyle/>
+          <a:p>
+            <a:fld id="{43F1BE90-FE9C-FB4E-A18A-9792DF813A96}" type="slidenum">
+              <a:rPr lang="en-US" smtClean="0"/>
+              <a:pPr/>
+              <a:t>22</a:t>
+            </a:fld>
+            <a:endParaRPr lang="en-US"/>
+          </a:p>
+        </p:txBody>
+      </p:sp>
+      <p:pic>
+        <p:nvPicPr>
+          <p:cNvPr id="7" name="Picture 6" descr="Screenshot 2015-12-17 19.28.05.png"/>
+          <p:cNvPicPr>
+            <a:picLocks noChangeAspect="1"/>
+          </p:cNvPicPr>
+          <p:nvPr/>
+        </p:nvPicPr>
+        <p:blipFill>
+          <a:blip r:embed="rId2"/>
+          <a:stretch>
+            <a:fillRect/>
+          </a:stretch>
+        </p:blipFill>
+        <p:spPr>
+          <a:xfrm>
+            <a:off x="606944" y="2410559"/>
+            <a:ext cx="7885841" cy="3715603"/>
+          </a:xfrm>
+          <a:prstGeom prst="rect">
+            <a:avLst/>
+          </a:prstGeom>
+        </p:spPr>
+      </p:pic>
+    </p:spTree>
+  </p:cSld>
+  <p:clrMapOvr>
+    <a:masterClrMapping/>
+  </p:clrMapOvr>
+</p:sld>
+</file>
+
+<file path=ppt/slides/slide22.xml><?xml version="1.0" encoding="utf-8"?>
+<p:sld xmlns:a="http://schemas.openxmlformats.org/drawingml/2006/main" xmlns:r="http://schemas.openxmlformats.org/officeDocument/2006/relationships" xmlns:mc="http://schemas.openxmlformats.org/markup-compatibility/2006" xmlns:mv="urn:schemas-microsoft-com:mac:vml" xmlns:p="http://schemas.openxmlformats.org/presentationml/2006/main" mc:Ignorable="mv" mc:PreserveAttributes="mv:*">
+  <p:cSld>
+    <p:spTree>
+      <p:nvGrpSpPr>
+        <p:cNvPr id="1" name=""/>
+        <p:cNvGrpSpPr/>
+        <p:nvPr/>
+      </p:nvGrpSpPr>
+      <p:grpSpPr>
+        <a:xfrm>
+          <a:off x="0" y="0"/>
+          <a:ext cx="0" cy="0"/>
+          <a:chOff x="0" y="0"/>
+          <a:chExt cx="0" cy="0"/>
+        </a:xfrm>
+      </p:grpSpPr>
+      <p:sp>
+        <p:nvSpPr>
+          <p:cNvPr id="2" name="Title 1"/>
+          <p:cNvSpPr>
+            <a:spLocks noGrp="1"/>
+          </p:cNvSpPr>
+          <p:nvPr>
+            <p:ph type="title"/>
+          </p:nvPr>
+        </p:nvSpPr>
+        <p:spPr/>
+        <p:txBody>
+          <a:bodyPr/>
+          <a:lstStyle/>
+          <a:p>
+            <a:r>
+              <a:rPr lang="en-US" b="1" dirty="0" smtClean="0">
+                <a:solidFill>
+                  <a:srgbClr val="BFBFBF"/>
+                </a:solidFill>
+              </a:rPr>
+              <a:t>Model Evaluation</a:t>
+            </a:r>
+            <a:endParaRPr lang="en-US" dirty="0"/>
+          </a:p>
+        </p:txBody>
+      </p:sp>
+      <p:pic>
+        <p:nvPicPr>
+          <p:cNvPr id="6" name="Content Placeholder 5" descr="Screenshot 2015-12-17 19.23.29.png"/>
+          <p:cNvPicPr>
+            <a:picLocks noGrp="1" noChangeAspect="1"/>
+          </p:cNvPicPr>
+          <p:nvPr>
+            <p:ph idx="1"/>
+          </p:nvPr>
+        </p:nvPicPr>
+        <p:blipFill>
+          <a:blip r:embed="rId2"/>
+          <a:srcRect t="-465" b="-465"/>
+          <a:stretch>
+            <a:fillRect/>
+          </a:stretch>
+        </p:blipFill>
+        <p:spPr/>
+      </p:pic>
+      <p:sp>
+        <p:nvSpPr>
+          <p:cNvPr id="4" name="Footer Placeholder 3"/>
+          <p:cNvSpPr>
+            <a:spLocks noGrp="1"/>
+          </p:cNvSpPr>
+          <p:nvPr>
+            <p:ph type="ftr" sz="quarter" idx="11"/>
+          </p:nvPr>
+        </p:nvSpPr>
+        <p:spPr/>
+        <p:txBody>
+          <a:bodyPr/>
+          <a:lstStyle/>
+          <a:p>
+            <a:endParaRPr lang="en-US"/>
+          </a:p>
+        </p:txBody>
+      </p:sp>
+      <p:sp>
+        <p:nvSpPr>
+          <p:cNvPr id="5" name="Slide Number Placeholder 4"/>
+          <p:cNvSpPr>
+            <a:spLocks noGrp="1"/>
+          </p:cNvSpPr>
+          <p:nvPr>
+            <p:ph type="sldNum" sz="quarter" idx="12"/>
+          </p:nvPr>
+        </p:nvSpPr>
+        <p:spPr/>
+        <p:txBody>
+          <a:bodyPr/>
+          <a:lstStyle/>
+          <a:p>
+            <a:fld id="{43F1BE90-FE9C-FB4E-A18A-9792DF813A96}" type="slidenum">
+              <a:rPr lang="en-US" smtClean="0"/>
+              <a:pPr/>
+              <a:t>23</a:t>
+            </a:fld>
+            <a:endParaRPr lang="en-US"/>
+          </a:p>
+        </p:txBody>
+      </p:sp>
+    </p:spTree>
+  </p:cSld>
+  <p:clrMapOvr>
+    <a:masterClrMapping/>
+  </p:clrMapOvr>
+</p:sld>
+</file>
+
+<file path=ppt/slides/slide23.xml><?xml version="1.0" encoding="utf-8"?>
+<p:sld xmlns:a="http://schemas.openxmlformats.org/drawingml/2006/main" xmlns:r="http://schemas.openxmlformats.org/officeDocument/2006/relationships" xmlns:mc="http://schemas.openxmlformats.org/markup-compatibility/2006" xmlns:mv="urn:schemas-microsoft-com:mac:vml" xmlns:p="http://schemas.openxmlformats.org/presentationml/2006/main" mc:Ignorable="mv" mc:PreserveAttributes="mv:*">
+  <p:cSld>
+    <p:spTree>
+      <p:nvGrpSpPr>
+        <p:cNvPr id="1" name=""/>
+        <p:cNvGrpSpPr/>
+        <p:nvPr/>
+      </p:nvGrpSpPr>
+      <p:grpSpPr>
+        <a:xfrm>
+          <a:off x="0" y="0"/>
+          <a:ext cx="0" cy="0"/>
+          <a:chOff x="0" y="0"/>
+          <a:chExt cx="0" cy="0"/>
+        </a:xfrm>
+      </p:grpSpPr>
+      <p:sp>
+        <p:nvSpPr>
+          <p:cNvPr id="2" name="Title 1"/>
+          <p:cNvSpPr>
+            <a:spLocks noGrp="1"/>
+          </p:cNvSpPr>
+          <p:nvPr>
+            <p:ph type="title"/>
+          </p:nvPr>
+        </p:nvSpPr>
+        <p:spPr/>
+        <p:txBody>
+          <a:bodyPr/>
+          <a:lstStyle/>
+          <a:p>
+            <a:r>
+              <a:rPr lang="en-US" b="1" dirty="0" smtClean="0">
+                <a:solidFill>
+                  <a:srgbClr val="BFBFBF"/>
+                </a:solidFill>
+              </a:rPr>
+              <a:t>Model Evaluation</a:t>
+            </a:r>
+            <a:endParaRPr lang="en-US" dirty="0"/>
+          </a:p>
+        </p:txBody>
+      </p:sp>
+      <p:pic>
+        <p:nvPicPr>
+          <p:cNvPr id="6" name="Content Placeholder 5" descr="Screenshot 2015-12-17 19.22.43.png"/>
+          <p:cNvPicPr>
+            <a:picLocks noGrp="1" noChangeAspect="1"/>
+          </p:cNvPicPr>
+          <p:nvPr>
+            <p:ph idx="1"/>
+          </p:nvPr>
+        </p:nvPicPr>
+        <p:blipFill>
+          <a:blip r:embed="rId2"/>
+          <a:srcRect t="-584" b="-584"/>
+          <a:stretch>
+            <a:fillRect/>
+          </a:stretch>
+        </p:blipFill>
+        <p:spPr/>
+      </p:pic>
+      <p:sp>
+        <p:nvSpPr>
+          <p:cNvPr id="4" name="Footer Placeholder 3"/>
+          <p:cNvSpPr>
+            <a:spLocks noGrp="1"/>
+          </p:cNvSpPr>
+          <p:nvPr>
+            <p:ph type="ftr" sz="quarter" idx="11"/>
+          </p:nvPr>
+        </p:nvSpPr>
+        <p:spPr/>
+        <p:txBody>
+          <a:bodyPr/>
+          <a:lstStyle/>
+          <a:p>
+            <a:endParaRPr lang="en-US"/>
+          </a:p>
+        </p:txBody>
+      </p:sp>
+      <p:sp>
+        <p:nvSpPr>
+          <p:cNvPr id="5" name="Slide Number Placeholder 4"/>
+          <p:cNvSpPr>
+            <a:spLocks noGrp="1"/>
+          </p:cNvSpPr>
+          <p:nvPr>
+            <p:ph type="sldNum" sz="quarter" idx="12"/>
+          </p:nvPr>
+        </p:nvSpPr>
+        <p:spPr/>
+        <p:txBody>
+          <a:bodyPr/>
+          <a:lstStyle/>
+          <a:p>
+            <a:fld id="{43F1BE90-FE9C-FB4E-A18A-9792DF813A96}" type="slidenum">
+              <a:rPr lang="en-US" smtClean="0"/>
+              <a:pPr/>
+              <a:t>24</a:t>
+            </a:fld>
+            <a:endParaRPr lang="en-US"/>
+          </a:p>
+        </p:txBody>
+      </p:sp>
+    </p:spTree>
+  </p:cSld>
+  <p:clrMapOvr>
+    <a:masterClrMapping/>
+  </p:clrMapOvr>
+</p:sld>
+</file>
+
+<file path=ppt/slides/slide24.xml><?xml version="1.0" encoding="utf-8"?>
+<p:sld xmlns:a="http://schemas.openxmlformats.org/drawingml/2006/main" xmlns:r="http://schemas.openxmlformats.org/officeDocument/2006/relationships" xmlns:mc="http://schemas.openxmlformats.org/markup-compatibility/2006" xmlns:mv="urn:schemas-microsoft-com:mac:vml" xmlns:p="http://schemas.openxmlformats.org/presentationml/2006/main" mc:Ignorable="mv" mc:PreserveAttributes="mv:*">
+  <p:cSld>
+    <p:spTree>
+      <p:nvGrpSpPr>
+        <p:cNvPr id="1" name=""/>
+        <p:cNvGrpSpPr/>
+        <p:nvPr/>
+      </p:nvGrpSpPr>
+      <p:grpSpPr>
+        <a:xfrm>
+          <a:off x="0" y="0"/>
+          <a:ext cx="0" cy="0"/>
+          <a:chOff x="0" y="0"/>
+          <a:chExt cx="0" cy="0"/>
+        </a:xfrm>
+      </p:grpSpPr>
+      <p:sp>
+        <p:nvSpPr>
+          <p:cNvPr id="2" name="Title 1"/>
+          <p:cNvSpPr>
+            <a:spLocks noGrp="1"/>
+          </p:cNvSpPr>
+          <p:nvPr>
+            <p:ph type="title"/>
+          </p:nvPr>
+        </p:nvSpPr>
+        <p:spPr/>
+        <p:txBody>
+          <a:bodyPr/>
+          <a:lstStyle/>
+          <a:p>
+            <a:r>
+              <a:rPr lang="en-US" b="1" dirty="0" smtClean="0">
                 <a:solidFill>
                   <a:schemeClr val="bg1">
                     <a:lumMod val="75000"/>
                   </a:schemeClr>
                 </a:solidFill>
               </a:rPr>
-              <a:t>Model Evaluation</a:t>
-            </a:r>
-            <a:endParaRPr lang="en-US" dirty="0">
-              <a:solidFill>
-                <a:schemeClr val="bg1">
-                  <a:lumMod val="75000"/>
-                </a:schemeClr>
-              </a:solidFill>
-            </a:endParaRPr>
-          </a:p>
-        </p:txBody>
-      </p:sp>
-      <p:graphicFrame>
-        <p:nvGraphicFramePr>
-          <p:cNvPr id="6" name="Content Placeholder 5"/>
-          <p:cNvGraphicFramePr>
-            <a:graphicFrameLocks noGrp="1"/>
-          </p:cNvGraphicFramePr>
+              <a:t>Further Work</a:t>
+            </a:r>
+            <a:endParaRPr lang="en-US" dirty="0"/>
+          </a:p>
+        </p:txBody>
+      </p:sp>
+      <p:sp>
+        <p:nvSpPr>
+          <p:cNvPr id="3" name="Content Placeholder 2"/>
+          <p:cNvSpPr>
+            <a:spLocks noGrp="1"/>
+          </p:cNvSpPr>
           <p:nvPr>
             <p:ph idx="1"/>
           </p:nvPr>
-        </p:nvGraphicFramePr>
-        <p:xfrm>
-          <a:off x="457200" y="1417638"/>
-          <a:ext cx="8229600" cy="1933413"/>
-        </p:xfrm>
-        <a:graphic>
-          <a:graphicData uri="http://schemas.openxmlformats.org/drawingml/2006/table">
-            <a:tbl>
-              <a:tblPr firstRow="1" bandRow="1">
-                <a:tableStyleId>{616DA210-FB5B-4158-B5E0-FEB733F419BA}</a:tableStyleId>
-              </a:tblPr>
-              <a:tblGrid>
-                <a:gridCol w="2743200"/>
-                <a:gridCol w="1761064"/>
-                <a:gridCol w="2353736"/>
-                <a:gridCol w="1371600"/>
-              </a:tblGrid>
-              <a:tr h="469089">
-                <a:tc>
-                  <a:txBody>
-                    <a:bodyPr/>
-                    <a:lstStyle/>
-                    <a:p>
-                      <a:endParaRPr lang="en-US" dirty="0"/>
-                    </a:p>
-                  </a:txBody>
-                  <a:tcPr/>
-                </a:tc>
-                <a:tc>
-                  <a:txBody>
-                    <a:bodyPr/>
-                    <a:lstStyle/>
-                    <a:p>
-                      <a:r>
-                        <a:rPr lang="en-US" dirty="0" smtClean="0"/>
-                        <a:t>Test Accuracy</a:t>
-                      </a:r>
-                      <a:endParaRPr lang="en-US" dirty="0"/>
-                    </a:p>
-                  </a:txBody>
-                  <a:tcPr/>
-                </a:tc>
-                <a:tc>
-                  <a:txBody>
-                    <a:bodyPr/>
-                    <a:lstStyle/>
-                    <a:p>
-                      <a:r>
-                        <a:rPr lang="en-US" dirty="0" smtClean="0"/>
-                        <a:t>Area Under PR</a:t>
-                      </a:r>
-                      <a:endParaRPr lang="en-US" dirty="0"/>
-                    </a:p>
-                  </a:txBody>
-                  <a:tcPr/>
-                </a:tc>
-                <a:tc>
-                  <a:txBody>
-                    <a:bodyPr/>
-                    <a:lstStyle/>
-                    <a:p>
-                      <a:r>
-                        <a:rPr lang="en-US" dirty="0" smtClean="0"/>
-                        <a:t>A</a:t>
-                      </a:r>
-                      <a:r>
-                        <a:rPr lang="en-US" baseline="0" dirty="0" smtClean="0"/>
-                        <a:t>U ROC</a:t>
-                      </a:r>
-                      <a:endParaRPr lang="en-US" dirty="0"/>
-                    </a:p>
-                  </a:txBody>
-                  <a:tcPr/>
-                </a:tc>
-              </a:tr>
-              <a:tr h="732162">
-                <a:tc>
-                  <a:txBody>
-                    <a:bodyPr/>
-                    <a:lstStyle/>
-                    <a:p>
-                      <a:r>
-                        <a:rPr lang="en-US" dirty="0" smtClean="0"/>
-                        <a:t>Decision Tree</a:t>
-                      </a:r>
-                      <a:endParaRPr lang="en-US" dirty="0"/>
-                    </a:p>
-                  </a:txBody>
-                  <a:tcPr/>
-                </a:tc>
-                <a:tc>
-                  <a:txBody>
-                    <a:bodyPr/>
-                    <a:lstStyle/>
-                    <a:p>
-                      <a:r>
-                        <a:rPr lang="en-US" dirty="0" smtClean="0"/>
-                        <a:t>64%</a:t>
-                      </a:r>
-                      <a:endParaRPr lang="en-US" dirty="0"/>
-                    </a:p>
-                  </a:txBody>
-                  <a:tcPr/>
-                </a:tc>
-                <a:tc>
-                  <a:txBody>
-                    <a:bodyPr/>
-                    <a:lstStyle/>
-                    <a:p>
-                      <a:r>
-                        <a:rPr lang="en-US" dirty="0" smtClean="0"/>
-                        <a:t>0.97</a:t>
-                      </a:r>
-                      <a:endParaRPr lang="en-US" dirty="0"/>
-                    </a:p>
-                  </a:txBody>
-                  <a:tcPr/>
-                </a:tc>
-                <a:tc>
-                  <a:txBody>
-                    <a:bodyPr/>
-                    <a:lstStyle/>
-                    <a:p>
-                      <a:r>
-                        <a:rPr lang="en-US" dirty="0" smtClean="0"/>
-                        <a:t>0.59</a:t>
-                      </a:r>
-                      <a:endParaRPr lang="en-US" dirty="0"/>
-                    </a:p>
-                  </a:txBody>
-                  <a:tcPr/>
-                </a:tc>
-              </a:tr>
-              <a:tr h="732162">
-                <a:tc>
-                  <a:txBody>
-                    <a:bodyPr/>
-                    <a:lstStyle/>
-                    <a:p>
-                      <a:r>
-                        <a:rPr lang="en-US" dirty="0" smtClean="0"/>
-                        <a:t>Logistic Regression</a:t>
-                      </a:r>
-                      <a:endParaRPr lang="en-US" dirty="0"/>
-                    </a:p>
-                  </a:txBody>
-                  <a:tcPr/>
-                </a:tc>
-                <a:tc>
-                  <a:txBody>
-                    <a:bodyPr/>
-                    <a:lstStyle/>
-                    <a:p>
-                      <a:r>
-                        <a:rPr lang="en-US" dirty="0" smtClean="0"/>
-                        <a:t>64%</a:t>
-                      </a:r>
-                      <a:endParaRPr lang="en-US" dirty="0"/>
-                    </a:p>
-                  </a:txBody>
-                  <a:tcPr/>
-                </a:tc>
-                <a:tc>
-                  <a:txBody>
-                    <a:bodyPr/>
-                    <a:lstStyle/>
-                    <a:p>
-                      <a:r>
-                        <a:rPr lang="en-US" dirty="0" smtClean="0"/>
-                        <a:t>0.82</a:t>
-                      </a:r>
-                      <a:endParaRPr lang="en-US" dirty="0"/>
-                    </a:p>
-                  </a:txBody>
-                  <a:tcPr/>
-                </a:tc>
-                <a:tc>
-                  <a:txBody>
-                    <a:bodyPr/>
-                    <a:lstStyle/>
-                    <a:p>
-                      <a:r>
-                        <a:rPr lang="en-US" dirty="0" smtClean="0"/>
-                        <a:t>0.50</a:t>
-                      </a:r>
-                      <a:endParaRPr lang="en-US" dirty="0"/>
-                    </a:p>
-                  </a:txBody>
-                  <a:tcPr/>
-                </a:tc>
-              </a:tr>
-            </a:tbl>
-          </a:graphicData>
-        </a:graphic>
-      </p:graphicFrame>
+        </p:nvSpPr>
+        <p:spPr/>
+        <p:txBody>
+          <a:bodyPr/>
+          <a:lstStyle/>
+          <a:p>
+            <a:r>
+              <a:rPr lang="en-US" dirty="0" smtClean="0"/>
+              <a:t>Parameter search</a:t>
+            </a:r>
+          </a:p>
+          <a:p>
+            <a:r>
+              <a:rPr lang="en-US" dirty="0" smtClean="0"/>
+              <a:t>More Feature Engineering</a:t>
+            </a:r>
+          </a:p>
+          <a:p>
+            <a:r>
+              <a:rPr lang="en-US" dirty="0" smtClean="0"/>
+              <a:t>Cross Validation</a:t>
+            </a:r>
+          </a:p>
+          <a:p>
+            <a:r>
+              <a:rPr lang="en-US" dirty="0" err="1" smtClean="0"/>
+              <a:t>Spark.ml</a:t>
+            </a:r>
+            <a:r>
+              <a:rPr lang="en-US" dirty="0" smtClean="0"/>
+              <a:t> </a:t>
+            </a:r>
+            <a:r>
+              <a:rPr lang="en-US" dirty="0" err="1" smtClean="0"/>
+              <a:t>vs</a:t>
+            </a:r>
+            <a:r>
+              <a:rPr lang="en-US" dirty="0" smtClean="0"/>
+              <a:t> </a:t>
+            </a:r>
+            <a:r>
+              <a:rPr lang="en-US" dirty="0" err="1" smtClean="0"/>
+              <a:t>MLlib</a:t>
+            </a:r>
+            <a:endParaRPr lang="en-US" dirty="0"/>
+          </a:p>
+        </p:txBody>
+      </p:sp>
       <p:sp>
         <p:nvSpPr>
           <p:cNvPr id="4" name="Footer Placeholder 3"/>
@@ -6537,117 +6818,378 @@
           <a:bodyPr/>
           <a:lstStyle/>
           <a:p>
-            <a:endParaRPr lang="en-US" dirty="0" smtClean="0"/>
-          </a:p>
-          <a:p>
             <a:r>
               <a:rPr lang="en-US" dirty="0" smtClean="0"/>
               <a:t>EE6893 Big Data Analytics</a:t>
             </a:r>
           </a:p>
-          <a:p>
+        </p:txBody>
+      </p:sp>
+      <p:sp>
+        <p:nvSpPr>
+          <p:cNvPr id="5" name="Slide Number Placeholder 4"/>
+          <p:cNvSpPr>
+            <a:spLocks noGrp="1"/>
+          </p:cNvSpPr>
+          <p:nvPr>
+            <p:ph type="sldNum" sz="quarter" idx="12"/>
+          </p:nvPr>
+        </p:nvSpPr>
+        <p:spPr/>
+        <p:txBody>
+          <a:bodyPr/>
+          <a:lstStyle/>
+          <a:p>
+            <a:fld id="{43F1BE90-FE9C-FB4E-A18A-9792DF813A96}" type="slidenum">
+              <a:rPr lang="en-US" smtClean="0"/>
+              <a:pPr/>
+              <a:t>25</a:t>
+            </a:fld>
+            <a:endParaRPr lang="en-US"/>
+          </a:p>
+        </p:txBody>
+      </p:sp>
+    </p:spTree>
+  </p:cSld>
+  <p:clrMapOvr>
+    <a:masterClrMapping/>
+  </p:clrMapOvr>
+</p:sld>
+</file>
+
+<file path=ppt/slides/slide25.xml><?xml version="1.0" encoding="utf-8"?>
+<p:sld xmlns:a="http://schemas.openxmlformats.org/drawingml/2006/main" xmlns:r="http://schemas.openxmlformats.org/officeDocument/2006/relationships" xmlns:mc="http://schemas.openxmlformats.org/markup-compatibility/2006" xmlns:mv="urn:schemas-microsoft-com:mac:vml" xmlns:p="http://schemas.openxmlformats.org/presentationml/2006/main" mc:Ignorable="mv" mc:PreserveAttributes="mv:*">
+  <p:cSld>
+    <p:spTree>
+      <p:nvGrpSpPr>
+        <p:cNvPr id="1" name=""/>
+        <p:cNvGrpSpPr/>
+        <p:nvPr/>
+      </p:nvGrpSpPr>
+      <p:grpSpPr>
+        <a:xfrm>
+          <a:off x="0" y="0"/>
+          <a:ext cx="0" cy="0"/>
+          <a:chOff x="0" y="0"/>
+          <a:chExt cx="0" cy="0"/>
+        </a:xfrm>
+      </p:grpSpPr>
+      <p:sp>
+        <p:nvSpPr>
+          <p:cNvPr id="2" name="Title 1"/>
+          <p:cNvSpPr>
+            <a:spLocks noGrp="1"/>
+          </p:cNvSpPr>
+          <p:nvPr>
+            <p:ph type="title"/>
+          </p:nvPr>
+        </p:nvSpPr>
+        <p:spPr/>
+        <p:txBody>
+          <a:bodyPr/>
+          <a:lstStyle/>
+          <a:p>
+            <a:r>
+              <a:rPr lang="en-US" b="1" dirty="0" smtClean="0">
+                <a:solidFill>
+                  <a:schemeClr val="bg1">
+                    <a:lumMod val="75000"/>
+                  </a:schemeClr>
+                </a:solidFill>
+              </a:rPr>
+              <a:t>Thank You!</a:t>
+            </a:r>
             <a:endParaRPr lang="en-US" dirty="0"/>
           </a:p>
         </p:txBody>
       </p:sp>
-      <p:sp>
-        <p:nvSpPr>
-          <p:cNvPr id="5" name="Slide Number Placeholder 4"/>
-          <p:cNvSpPr>
-            <a:spLocks noGrp="1"/>
-          </p:cNvSpPr>
-          <p:nvPr>
-            <p:ph type="sldNum" sz="quarter" idx="12"/>
-          </p:nvPr>
-        </p:nvSpPr>
-        <p:spPr/>
-        <p:txBody>
-          <a:bodyPr/>
-          <a:lstStyle/>
-          <a:p>
-            <a:fld id="{43F1BE90-FE9C-FB4E-A18A-9792DF813A96}" type="slidenum">
-              <a:rPr lang="en-US" smtClean="0"/>
-              <a:t>22</a:t>
-            </a:fld>
-            <a:endParaRPr lang="en-US"/>
-          </a:p>
-        </p:txBody>
-      </p:sp>
-      <p:sp>
-        <p:nvSpPr>
-          <p:cNvPr id="8" name="TextBox 7"/>
-          <p:cNvSpPr txBox="1"/>
-          <p:nvPr/>
-        </p:nvSpPr>
+      <p:pic>
+        <p:nvPicPr>
+          <p:cNvPr id="6" name="Content Placeholder 5" descr="Screenshot 2015-12-17 19.07.22.png"/>
+          <p:cNvPicPr>
+            <a:picLocks noGrp="1" noChangeAspect="1"/>
+          </p:cNvPicPr>
+          <p:nvPr>
+            <p:ph idx="1"/>
+          </p:nvPr>
+        </p:nvPicPr>
+        <p:blipFill>
+          <a:blip r:embed="rId2"/>
+          <a:srcRect t="-42059" b="-42059"/>
+          <a:stretch>
+            <a:fillRect/>
+          </a:stretch>
+        </p:blipFill>
         <p:spPr>
           <a:xfrm>
-            <a:off x="457200" y="3351051"/>
-            <a:ext cx="8229600" cy="3108544"/>
+            <a:off x="1978668" y="4486869"/>
+            <a:ext cx="2523482" cy="1387817"/>
+          </a:xfrm>
+        </p:spPr>
+      </p:pic>
+      <p:sp>
+        <p:nvSpPr>
+          <p:cNvPr id="4" name="Footer Placeholder 3"/>
+          <p:cNvSpPr>
+            <a:spLocks noGrp="1"/>
+          </p:cNvSpPr>
+          <p:nvPr>
+            <p:ph type="ftr" sz="quarter" idx="11"/>
+          </p:nvPr>
+        </p:nvSpPr>
+        <p:spPr/>
+        <p:txBody>
+          <a:bodyPr/>
+          <a:lstStyle/>
+          <a:p>
+            <a:endParaRPr lang="en-US" dirty="0" smtClean="0"/>
+          </a:p>
+          <a:p>
+            <a:r>
+              <a:rPr lang="en-US" dirty="0" smtClean="0"/>
+              <a:t>EE6893 </a:t>
+            </a:r>
+            <a:r>
+              <a:rPr lang="en-US" dirty="0" smtClean="0"/>
+              <a:t>Big Data Analytics</a:t>
+            </a:r>
+          </a:p>
+          <a:p>
+            <a:endParaRPr lang="en-US" dirty="0"/>
+          </a:p>
+        </p:txBody>
+      </p:sp>
+      <p:sp>
+        <p:nvSpPr>
+          <p:cNvPr id="5" name="Slide Number Placeholder 4"/>
+          <p:cNvSpPr>
+            <a:spLocks noGrp="1"/>
+          </p:cNvSpPr>
+          <p:nvPr>
+            <p:ph type="sldNum" sz="quarter" idx="12"/>
+          </p:nvPr>
+        </p:nvSpPr>
+        <p:spPr/>
+        <p:txBody>
+          <a:bodyPr/>
+          <a:lstStyle/>
+          <a:p>
+            <a:fld id="{43F1BE90-FE9C-FB4E-A18A-9792DF813A96}" type="slidenum">
+              <a:rPr lang="en-US" smtClean="0"/>
+              <a:pPr/>
+              <a:t>26</a:t>
+            </a:fld>
+            <a:endParaRPr lang="en-US"/>
+          </a:p>
+        </p:txBody>
+      </p:sp>
+      <p:pic>
+        <p:nvPicPr>
+          <p:cNvPr id="7" name="Picture 6" descr="Screenshot 2015-12-17 19.06.32.png"/>
+          <p:cNvPicPr>
+            <a:picLocks noChangeAspect="1"/>
+          </p:cNvPicPr>
+          <p:nvPr/>
+        </p:nvPicPr>
+        <p:blipFill>
+          <a:blip r:embed="rId3"/>
+          <a:stretch>
+            <a:fillRect/>
+          </a:stretch>
+        </p:blipFill>
+        <p:spPr>
+          <a:xfrm>
+            <a:off x="1617845" y="2894013"/>
+            <a:ext cx="1981200" cy="723900"/>
           </a:xfrm>
           <a:prstGeom prst="rect">
             <a:avLst/>
           </a:prstGeom>
-          <a:noFill/>
         </p:spPr>
-        <p:txBody>
-          <a:bodyPr wrap="square" rtlCol="0">
-            <a:spAutoFit/>
+      </p:pic>
+      <p:pic>
+        <p:nvPicPr>
+          <p:cNvPr id="8" name="Picture 7" descr="Screenshot 2015-12-17 19.06.17.png"/>
+          <p:cNvPicPr>
+            <a:picLocks noChangeAspect="1"/>
+          </p:cNvPicPr>
+          <p:nvPr/>
+        </p:nvPicPr>
+        <p:blipFill>
+          <a:blip r:embed="rId4"/>
+          <a:stretch>
+            <a:fillRect/>
+          </a:stretch>
+        </p:blipFill>
+        <p:spPr>
+          <a:xfrm>
+            <a:off x="1746250" y="1417638"/>
+            <a:ext cx="2755900" cy="1066800"/>
+          </a:xfrm>
+          <a:prstGeom prst="rect">
+            <a:avLst/>
+          </a:prstGeom>
+        </p:spPr>
+      </p:pic>
+      <p:pic>
+        <p:nvPicPr>
+          <p:cNvPr id="9" name="Picture 8" descr="Screenshot 2015-12-17 19.05.31.png"/>
+          <p:cNvPicPr>
+            <a:picLocks noChangeAspect="1"/>
+          </p:cNvPicPr>
+          <p:nvPr/>
+        </p:nvPicPr>
+        <p:blipFill>
+          <a:blip r:embed="rId5"/>
+          <a:stretch>
+            <a:fillRect/>
+          </a:stretch>
+        </p:blipFill>
+        <p:spPr>
+          <a:xfrm>
+            <a:off x="4587875" y="2014538"/>
+            <a:ext cx="2489200" cy="2692400"/>
+          </a:xfrm>
+          <a:prstGeom prst="rect">
+            <a:avLst/>
+          </a:prstGeom>
+        </p:spPr>
+      </p:pic>
+    </p:spTree>
+  </p:cSld>
+  <p:clrMapOvr>
+    <a:masterClrMapping/>
+  </p:clrMapOvr>
+</p:sld>
+</file>
+
+<file path=ppt/slides/slide26.xml><?xml version="1.0" encoding="utf-8"?>
+<p:sld xmlns:a="http://schemas.openxmlformats.org/drawingml/2006/main" xmlns:r="http://schemas.openxmlformats.org/officeDocument/2006/relationships" xmlns:mc="http://schemas.openxmlformats.org/markup-compatibility/2006" xmlns:mv="urn:schemas-microsoft-com:mac:vml" xmlns:p="http://schemas.openxmlformats.org/presentationml/2006/main" mc:Ignorable="mv" mc:PreserveAttributes="mv:*">
+  <p:cSld>
+    <p:spTree>
+      <p:nvGrpSpPr>
+        <p:cNvPr id="1" name=""/>
+        <p:cNvGrpSpPr/>
+        <p:nvPr/>
+      </p:nvGrpSpPr>
+      <p:grpSpPr>
+        <a:xfrm>
+          <a:off x="0" y="0"/>
+          <a:ext cx="0" cy="0"/>
+          <a:chOff x="0" y="0"/>
+          <a:chExt cx="0" cy="0"/>
+        </a:xfrm>
+      </p:grpSpPr>
+      <p:sp>
+        <p:nvSpPr>
+          <p:cNvPr id="2" name="Title 1"/>
+          <p:cNvSpPr>
+            <a:spLocks noGrp="1"/>
+          </p:cNvSpPr>
+          <p:nvPr>
+            <p:ph type="title"/>
+          </p:nvPr>
+        </p:nvSpPr>
+        <p:spPr/>
+        <p:txBody>
+          <a:bodyPr/>
+          <a:lstStyle/>
+          <a:p>
+            <a:r>
+              <a:rPr lang="en-US" b="1" dirty="0" smtClean="0">
+                <a:solidFill>
+                  <a:schemeClr val="bg1">
+                    <a:lumMod val="75000"/>
+                  </a:schemeClr>
+                </a:solidFill>
+              </a:rPr>
+              <a:t>Discussion</a:t>
+            </a:r>
+            <a:endParaRPr lang="en-US" dirty="0"/>
+          </a:p>
+        </p:txBody>
+      </p:sp>
+      <p:sp>
+        <p:nvSpPr>
+          <p:cNvPr id="3" name="Content Placeholder 2"/>
+          <p:cNvSpPr>
+            <a:spLocks noGrp="1"/>
+          </p:cNvSpPr>
+          <p:nvPr>
+            <p:ph idx="1"/>
+          </p:nvPr>
+        </p:nvSpPr>
+        <p:spPr/>
+        <p:txBody>
+          <a:bodyPr>
+            <a:normAutofit/>
           </a:bodyPr>
           <a:lstStyle/>
           <a:p>
-            <a:r>
-              <a:rPr lang="en-US" sz="2800" b="1" dirty="0" smtClean="0"/>
-              <a:t>Decision Tree</a:t>
-            </a:r>
-            <a:r>
-              <a:rPr lang="en-US" sz="2800" dirty="0" smtClean="0"/>
-              <a:t> performed better than Logistic Regress.</a:t>
-            </a:r>
-          </a:p>
-          <a:p>
-            <a:r>
-              <a:rPr lang="en-US" sz="2800" dirty="0" smtClean="0"/>
-              <a:t>Generally though, these results, while better than random guessing, are </a:t>
-            </a:r>
-            <a:r>
-              <a:rPr lang="en-US" sz="2800" b="1" dirty="0" smtClean="0"/>
-              <a:t>not good</a:t>
-            </a:r>
-            <a:r>
-              <a:rPr lang="en-US" sz="2800" dirty="0" smtClean="0"/>
-              <a:t>. We think we can improve these results by:</a:t>
-            </a:r>
-          </a:p>
-          <a:p>
             <a:pPr>
-              <a:buFont typeface="Arial"/>
-              <a:buChar char="•"/>
+              <a:buNone/>
             </a:pPr>
             <a:r>
-              <a:rPr lang="en-US" sz="2800" dirty="0" smtClean="0"/>
-              <a:t> Generating more/different features</a:t>
-            </a:r>
-          </a:p>
-          <a:p>
-            <a:pPr>
-              <a:buFont typeface="Arial"/>
-              <a:buChar char="•"/>
-            </a:pPr>
-            <a:r>
-              <a:rPr lang="en-US" sz="2800" dirty="0" smtClean="0"/>
-              <a:t> Using a larger dataset</a:t>
-            </a:r>
-          </a:p>
-          <a:p>
-            <a:pPr>
-              <a:buFont typeface="Arial"/>
-              <a:buChar char="•"/>
-            </a:pPr>
-            <a:r>
-              <a:rPr lang="en-US" sz="2800" dirty="0" smtClean="0"/>
-              <a:t> Generating models using Random Forest.</a:t>
-            </a:r>
-            <a:endParaRPr lang="en-US" sz="2800" dirty="0"/>
+              <a:rPr lang="en-US" sz="5400" dirty="0" smtClean="0"/>
+              <a:t>Questions?</a:t>
+            </a:r>
+            <a:endParaRPr lang="en-US" sz="5400" dirty="0"/>
+          </a:p>
+        </p:txBody>
+      </p:sp>
+      <p:sp>
+        <p:nvSpPr>
+          <p:cNvPr id="4" name="Footer Placeholder 3"/>
+          <p:cNvSpPr>
+            <a:spLocks noGrp="1"/>
+          </p:cNvSpPr>
+          <p:nvPr>
+            <p:ph type="ftr" sz="quarter" idx="11"/>
+          </p:nvPr>
+        </p:nvSpPr>
+        <p:spPr/>
+        <p:txBody>
+          <a:bodyPr/>
+          <a:lstStyle/>
+          <a:p>
+            <a:endParaRPr lang="en-US" dirty="0" smtClean="0"/>
+          </a:p>
+          <a:p>
+            <a:r>
+              <a:rPr lang="en-US" dirty="0" smtClean="0"/>
+              <a:t>EE6893 </a:t>
+            </a:r>
+            <a:r>
+              <a:rPr lang="en-US" dirty="0" smtClean="0"/>
+              <a:t>Big Data Analytics</a:t>
+            </a:r>
+          </a:p>
+          <a:p>
+            <a:endParaRPr lang="en-US" dirty="0"/>
+          </a:p>
+        </p:txBody>
+      </p:sp>
+      <p:sp>
+        <p:nvSpPr>
+          <p:cNvPr id="5" name="Slide Number Placeholder 4"/>
+          <p:cNvSpPr>
+            <a:spLocks noGrp="1"/>
+          </p:cNvSpPr>
+          <p:nvPr>
+            <p:ph type="sldNum" sz="quarter" idx="12"/>
+          </p:nvPr>
+        </p:nvSpPr>
+        <p:spPr/>
+        <p:txBody>
+          <a:bodyPr/>
+          <a:lstStyle/>
+          <a:p>
+            <a:fld id="{43F1BE90-FE9C-FB4E-A18A-9792DF813A96}" type="slidenum">
+              <a:rPr lang="en-US" smtClean="0"/>
+              <a:pPr/>
+              <a:t>27</a:t>
+            </a:fld>
+            <a:endParaRPr lang="en-US"/>
           </a:p>
         </p:txBody>
       </p:sp>
@@ -6692,14 +7234,14 @@
           <a:lstStyle/>
           <a:p>
             <a:r>
-              <a:rPr lang="en-US" dirty="0" smtClean="0">
+              <a:rPr lang="en-US" b="1" dirty="0" smtClean="0">
                 <a:solidFill>
                   <a:srgbClr val="A6A6A6"/>
                 </a:solidFill>
               </a:rPr>
               <a:t>Tools</a:t>
             </a:r>
-            <a:endParaRPr lang="en-US" dirty="0"/>
+            <a:endParaRPr lang="en-US" b="1" dirty="0"/>
           </a:p>
         </p:txBody>
       </p:sp>
@@ -6737,7 +7279,7 @@
                   <a:srgbClr val="4F81BD"/>
                 </a:solidFill>
               </a:rPr>
-              <a:t>MLLib</a:t>
+              <a:t>MLlib</a:t>
             </a:r>
             <a:endParaRPr lang="en-US" b="1" dirty="0" smtClean="0">
               <a:solidFill>
@@ -6760,7 +7302,15 @@
             </a:pPr>
             <a:r>
               <a:rPr lang="en-US" dirty="0" smtClean="0"/>
-              <a:t>data science pipeline (feature transformation,</a:t>
+              <a:t>data science pipeline (</a:t>
+            </a:r>
+            <a:r>
+              <a:rPr lang="en-US" i="1" dirty="0" smtClean="0"/>
+              <a:t>feature transformation</a:t>
+            </a:r>
+            <a:r>
+              <a:rPr lang="en-US" dirty="0" smtClean="0"/>
+              <a:t>,</a:t>
             </a:r>
           </a:p>
           <a:p>
@@ -6768,8 +7318,16 @@
               <a:buNone/>
             </a:pPr>
             <a:r>
-              <a:rPr lang="en-US" dirty="0" smtClean="0"/>
-              <a:t>machine learning, etc). However, we only used</a:t>
+              <a:rPr lang="en-US" i="1" dirty="0" smtClean="0"/>
+              <a:t>machine learning</a:t>
+            </a:r>
+            <a:r>
+              <a:rPr lang="en-US" dirty="0" smtClean="0"/>
+              <a:t>, </a:t>
+            </a:r>
+            <a:r>
+              <a:rPr lang="en-US" dirty="0" smtClean="0"/>
+              <a:t>etc). However, we only used</a:t>
             </a:r>
           </a:p>
           <a:p>
@@ -6786,11 +7344,15 @@
             </a:r>
             <a:r>
               <a:rPr lang="en-US" dirty="0" err="1" smtClean="0"/>
-              <a:t>MLLib</a:t>
-            </a:r>
-            <a:r>
-              <a:rPr lang="en-US" dirty="0" smtClean="0"/>
-              <a:t> library for building our models.</a:t>
+              <a:t>MLlib</a:t>
+            </a:r>
+            <a:r>
+              <a:rPr lang="en-US" dirty="0" smtClean="0"/>
+              <a:t> </a:t>
+            </a:r>
+            <a:r>
+              <a:rPr lang="en-US" dirty="0" smtClean="0"/>
+              <a:t>library for building our models.</a:t>
             </a:r>
           </a:p>
           <a:p>
@@ -6853,6 +7415,7 @@
           <a:p>
             <a:fld id="{43F1BE90-FE9C-FB4E-A18A-9792DF813A96}" type="slidenum">
               <a:rPr lang="en-US" smtClean="0"/>
+              <a:pPr/>
               <a:t>4</a:t>
             </a:fld>
             <a:endParaRPr lang="en-US"/>
@@ -6900,14 +7463,14 @@
           <a:lstStyle/>
           <a:p>
             <a:r>
-              <a:rPr lang="en-US" dirty="0" smtClean="0">
+              <a:rPr lang="en-US" b="1" dirty="0" smtClean="0">
                 <a:solidFill>
                   <a:srgbClr val="A6A6A6"/>
                 </a:solidFill>
               </a:rPr>
               <a:t>Tools</a:t>
             </a:r>
-            <a:endParaRPr lang="en-US" dirty="0"/>
+            <a:endParaRPr lang="en-US" b="1" dirty="0"/>
           </a:p>
         </p:txBody>
       </p:sp>
@@ -6946,11 +7509,7 @@
             </a:pPr>
             <a:r>
               <a:rPr lang="en-US" dirty="0" smtClean="0"/>
-              <a:t>We used </a:t>
-            </a:r>
-            <a:r>
-              <a:rPr lang="en-US" dirty="0" smtClean="0"/>
-              <a:t>Python (v2.x) for acquiring the relevant</a:t>
+              <a:t>We used Python (v2.x) for acquiring the relevant</a:t>
             </a:r>
           </a:p>
           <a:p>
@@ -6968,11 +7527,7 @@
             </a:pPr>
             <a:r>
               <a:rPr lang="en-US" dirty="0" smtClean="0"/>
-              <a:t>extensively in our data munging effort:</a:t>
-            </a:r>
-            <a:r>
-              <a:rPr lang="en-US" dirty="0" smtClean="0"/>
-              <a:t> </a:t>
+              <a:t>extensively in our data munging effort: </a:t>
             </a:r>
           </a:p>
           <a:p>
@@ -7103,6 +7658,7 @@
           <a:p>
             <a:fld id="{43F1BE90-FE9C-FB4E-A18A-9792DF813A96}" type="slidenum">
               <a:rPr lang="en-US" smtClean="0"/>
+              <a:pPr/>
               <a:t>5</a:t>
             </a:fld>
             <a:endParaRPr lang="en-US"/>
@@ -7150,14 +7706,14 @@
           <a:lstStyle/>
           <a:p>
             <a:r>
-              <a:rPr lang="en-US" dirty="0" smtClean="0">
+              <a:rPr lang="en-US" b="1" dirty="0" smtClean="0">
                 <a:solidFill>
                   <a:srgbClr val="A6A6A6"/>
                 </a:solidFill>
               </a:rPr>
               <a:t>Machine Learning Model</a:t>
             </a:r>
-            <a:endParaRPr lang="en-US" dirty="0"/>
+            <a:endParaRPr lang="en-US" b="1" dirty="0"/>
           </a:p>
         </p:txBody>
       </p:sp>
@@ -7230,6 +7786,7 @@
           <a:p>
             <a:fld id="{43F1BE90-FE9C-FB4E-A18A-9792DF813A96}" type="slidenum">
               <a:rPr lang="en-US" smtClean="0"/>
+              <a:pPr/>
               <a:t>6</a:t>
             </a:fld>
             <a:endParaRPr lang="en-US"/>
@@ -7323,7 +7880,7 @@
           <a:lstStyle/>
           <a:p>
             <a:r>
-              <a:rPr lang="en-US" dirty="0" smtClean="0">
+              <a:rPr lang="en-US" b="1" dirty="0" smtClean="0">
                 <a:solidFill>
                   <a:schemeClr val="bg1">
                     <a:lumMod val="75000"/>
@@ -7332,7 +7889,7 @@
               </a:rPr>
               <a:t>Machine Learning Model</a:t>
             </a:r>
-            <a:endParaRPr lang="en-US" dirty="0">
+            <a:endParaRPr lang="en-US" b="1" dirty="0">
               <a:solidFill>
                 <a:schemeClr val="bg1">
                   <a:lumMod val="75000"/>
@@ -7445,6 +8002,7 @@
           <a:p>
             <a:fld id="{43F1BE90-FE9C-FB4E-A18A-9792DF813A96}" type="slidenum">
               <a:rPr lang="en-US" smtClean="0"/>
+              <a:pPr/>
               <a:t>7</a:t>
             </a:fld>
             <a:endParaRPr lang="en-US"/>
@@ -7497,7 +8055,7 @@
           <a:lstStyle/>
           <a:p>
             <a:r>
-              <a:rPr lang="en-US" dirty="0" smtClean="0">
+              <a:rPr lang="en-US" b="1" dirty="0" smtClean="0">
                 <a:solidFill>
                   <a:srgbClr val="BFBFBF"/>
                 </a:solidFill>
@@ -7505,11 +8063,11 @@
               <a:t>Data</a:t>
             </a:r>
             <a:r>
-              <a:rPr lang="en-US" dirty="0" smtClean="0"/>
+              <a:rPr lang="en-US" b="1" dirty="0" smtClean="0"/>
               <a:t> </a:t>
             </a:r>
             <a:r>
-              <a:rPr lang="en-US" sz="4000" dirty="0" smtClean="0">
+              <a:rPr lang="en-US" sz="4000" b="1" dirty="0" smtClean="0">
                 <a:solidFill>
                   <a:schemeClr val="bg1">
                     <a:lumMod val="75000"/>
@@ -7518,7 +8076,7 @@
               </a:rPr>
               <a:t>Gathering</a:t>
             </a:r>
-            <a:endParaRPr lang="en-US" sz="4000" dirty="0">
+            <a:endParaRPr lang="en-US" sz="4000" b="1" dirty="0">
               <a:solidFill>
                 <a:schemeClr val="bg1">
                   <a:lumMod val="75000"/>
@@ -7603,7 +8161,6 @@
               <a:rPr lang="en-US" sz="1800" b="1" dirty="0" smtClean="0"/>
               <a:t>Yahoo</a:t>
             </a:r>
-            <a:endParaRPr lang="en-US" sz="1800" b="1" dirty="0" smtClean="0"/>
           </a:p>
           <a:p>
             <a:endParaRPr lang="en-US" sz="2400" dirty="0" smtClean="0"/>
@@ -7667,6 +8224,7 @@
           <a:p>
             <a:fld id="{43F1BE90-FE9C-FB4E-A18A-9792DF813A96}" type="slidenum">
               <a:rPr lang="en-US" smtClean="0"/>
+              <a:pPr/>
               <a:t>8</a:t>
             </a:fld>
             <a:endParaRPr lang="en-US"/>
@@ -7769,7 +8327,7 @@
           <a:lstStyle/>
           <a:p>
             <a:r>
-              <a:rPr lang="en-US" sz="4000" dirty="0" smtClean="0">
+              <a:rPr lang="en-US" sz="4000" b="1" dirty="0" smtClean="0">
                 <a:solidFill>
                   <a:srgbClr val="BFBFBF"/>
                 </a:solidFill>
@@ -7777,11 +8335,11 @@
               <a:t>Data</a:t>
             </a:r>
             <a:r>
-              <a:rPr lang="en-US" sz="4000" dirty="0" smtClean="0"/>
+              <a:rPr lang="en-US" sz="4000" b="1" dirty="0" smtClean="0"/>
               <a:t> </a:t>
             </a:r>
             <a:r>
-              <a:rPr lang="en-US" sz="4000" dirty="0" smtClean="0">
+              <a:rPr lang="en-US" sz="4000" b="1" dirty="0" smtClean="0">
                 <a:solidFill>
                   <a:schemeClr val="bg1">
                     <a:lumMod val="75000"/>
@@ -7790,7 +8348,7 @@
               </a:rPr>
               <a:t>Gathering</a:t>
             </a:r>
-            <a:endParaRPr lang="en-US" sz="4000" dirty="0"/>
+            <a:endParaRPr lang="en-US" sz="4000" b="1" dirty="0"/>
           </a:p>
         </p:txBody>
       </p:sp>
@@ -7917,6 +8475,7 @@
           <a:p>
             <a:fld id="{43F1BE90-FE9C-FB4E-A18A-9792DF813A96}" type="slidenum">
               <a:rPr lang="en-US" smtClean="0"/>
+              <a:pPr/>
               <a:t>9</a:t>
             </a:fld>
             <a:endParaRPr lang="en-US"/>
@@ -7925,7 +8484,7 @@
       </p:sp>
       <p:pic>
         <p:nvPicPr>
-          <p:cNvPr id="6" name="Picture 5" descr="Screenshot 2015-12-15 23.44.16.png"/>
+          <p:cNvPr id="8" name="Picture 7" descr="Screenshot 2015-12-17 19.45.10.png"/>
           <p:cNvPicPr>
             <a:picLocks noChangeAspect="1"/>
           </p:cNvPicPr>
@@ -7939,24 +8498,17 @@
         </p:blipFill>
         <p:spPr>
           <a:xfrm>
-            <a:off x="307262" y="2492915"/>
-            <a:ext cx="5926124" cy="2910323"/>
+            <a:off x="2912450" y="2243195"/>
+            <a:ext cx="5104655" cy="3189408"/>
           </a:xfrm>
           <a:prstGeom prst="rect">
             <a:avLst/>
           </a:prstGeom>
-          <a:effectLst>
-            <a:outerShdw blurRad="63500" sx="102000" sy="102000" algn="ctr">
-              <a:srgbClr val="000000">
-                <a:alpha val="43000"/>
-              </a:srgbClr>
-            </a:outerShdw>
-          </a:effectLst>
         </p:spPr>
       </p:pic>
       <p:pic>
         <p:nvPicPr>
-          <p:cNvPr id="7" name="Picture 6" descr="Screenshot 2015-12-15 23.45.14.png"/>
+          <p:cNvPr id="9" name="Picture 8" descr="Screenshot 2015-12-17 19.46.11.png"/>
           <p:cNvPicPr>
             <a:picLocks noChangeAspect="1"/>
           </p:cNvPicPr>
@@ -7970,16 +8522,19 @@
         </p:blipFill>
         <p:spPr>
           <a:xfrm>
-            <a:off x="3124200" y="3040242"/>
-            <a:ext cx="5562600" cy="2870380"/>
+            <a:off x="342230" y="3517809"/>
+            <a:ext cx="5140440" cy="2608354"/>
           </a:xfrm>
           <a:prstGeom prst="rect">
             <a:avLst/>
           </a:prstGeom>
+          <a:ln>
+            <a:noFill/>
+          </a:ln>
           <a:effectLst>
-            <a:outerShdw blurRad="50800" dist="38100" dir="13500000" algn="tl">
-              <a:srgbClr val="000000">
-                <a:alpha val="43000"/>
+            <a:outerShdw blurRad="292100" dist="139700" dir="2700000" algn="tl" rotWithShape="0">
+              <a:srgbClr val="333333">
+                <a:alpha val="65000"/>
               </a:srgbClr>
             </a:outerShdw>
           </a:effectLst>
@@ -8028,7 +8583,7 @@
           <a:lstStyle/>
           <a:p>
             <a:r>
-              <a:rPr lang="en-US" sz="4000" dirty="0" smtClean="0">
+              <a:rPr lang="en-US" sz="4000" b="1" dirty="0" smtClean="0">
                 <a:solidFill>
                   <a:schemeClr val="bg1">
                     <a:lumMod val="75000"/>
@@ -8037,7 +8592,7 @@
               </a:rPr>
               <a:t>Tidy Data</a:t>
             </a:r>
-            <a:endParaRPr lang="en-US" sz="4000" dirty="0">
+            <a:endParaRPr lang="en-US" sz="4000" b="1" dirty="0">
               <a:solidFill>
                 <a:schemeClr val="bg1">
                   <a:lumMod val="75000"/>
@@ -8151,6 +8706,7 @@
           <a:p>
             <a:fld id="{43F1BE90-FE9C-FB4E-A18A-9792DF813A96}" type="slidenum">
               <a:rPr lang="en-US" smtClean="0"/>
+              <a:pPr/>
               <a:t>10</a:t>
             </a:fld>
             <a:endParaRPr lang="en-US"/>

</xml_diff>

<commit_message>
updates to score, models and presentation
</commit_message>
<xml_diff>
--- a/FinalPresentation.pptx
+++ b/FinalPresentation.pptx
@@ -221,7 +221,7 @@
             <a:fld id="{7B7538EB-ED4A-824F-9E5A-77D69CDA3FFB}" type="datetime1">
               <a:rPr lang="en-US" smtClean="0"/>
               <a:pPr/>
-              <a:t>12/17/15</a:t>
+              <a:t>12/22/15</a:t>
             </a:fld>
             <a:endParaRPr lang="en-US"/>
           </a:p>
@@ -384,7 +384,7 @@
             <a:fld id="{DE2AC196-93EC-7444-9E78-D5CC1140CC1D}" type="datetime1">
               <a:rPr lang="en-US" smtClean="0"/>
               <a:pPr/>
-              <a:t>12/17/15</a:t>
+              <a:t>12/22/15</a:t>
             </a:fld>
             <a:endParaRPr lang="en-US"/>
           </a:p>
@@ -953,7 +953,7 @@
             <a:fld id="{9B4E26E5-939F-5B4A-84C4-5B727F745DAC}" type="datetime1">
               <a:rPr lang="en-US" smtClean="0"/>
               <a:pPr/>
-              <a:t>12/17/15</a:t>
+              <a:t>12/22/15</a:t>
             </a:fld>
             <a:endParaRPr lang="en-US"/>
           </a:p>
@@ -1120,7 +1120,7 @@
             <a:fld id="{83129D36-3A9E-854B-9A6A-6F50EE41B8AE}" type="datetime1">
               <a:rPr lang="en-US" smtClean="0"/>
               <a:pPr/>
-              <a:t>12/17/15</a:t>
+              <a:t>12/22/15</a:t>
             </a:fld>
             <a:endParaRPr lang="en-US"/>
           </a:p>
@@ -1297,7 +1297,7 @@
             <a:fld id="{F4175A00-F00A-0F47-A3C5-FEBD0231010D}" type="datetime1">
               <a:rPr lang="en-US" smtClean="0"/>
               <a:pPr/>
-              <a:t>12/17/15</a:t>
+              <a:t>12/22/15</a:t>
             </a:fld>
             <a:endParaRPr lang="en-US"/>
           </a:p>
@@ -1464,7 +1464,7 @@
             <a:fld id="{380E7C7A-B23E-B24A-8733-97A84B0DCA49}" type="datetime1">
               <a:rPr lang="en-US" smtClean="0"/>
               <a:pPr/>
-              <a:t>12/17/15</a:t>
+              <a:t>12/22/15</a:t>
             </a:fld>
             <a:endParaRPr lang="en-US"/>
           </a:p>
@@ -1707,7 +1707,7 @@
             <a:fld id="{5EDB3573-33BE-CB43-AED9-96978F10F7CB}" type="datetime1">
               <a:rPr lang="en-US" smtClean="0"/>
               <a:pPr/>
-              <a:t>12/17/15</a:t>
+              <a:t>12/22/15</a:t>
             </a:fld>
             <a:endParaRPr lang="en-US"/>
           </a:p>
@@ -1992,7 +1992,7 @@
             <a:fld id="{C3652D88-4C5A-4843-930D-E3D2FB180C8B}" type="datetime1">
               <a:rPr lang="en-US" smtClean="0"/>
               <a:pPr/>
-              <a:t>12/17/15</a:t>
+              <a:t>12/22/15</a:t>
             </a:fld>
             <a:endParaRPr lang="en-US"/>
           </a:p>
@@ -2411,7 +2411,7 @@
             <a:fld id="{8FB5AAD1-5A58-1842-BF23-B7C78A728B6E}" type="datetime1">
               <a:rPr lang="en-US" smtClean="0"/>
               <a:pPr/>
-              <a:t>12/17/15</a:t>
+              <a:t>12/22/15</a:t>
             </a:fld>
             <a:endParaRPr lang="en-US"/>
           </a:p>
@@ -2526,7 +2526,7 @@
             <a:fld id="{C05034B4-28F4-FB45-A827-80D386119DDC}" type="datetime1">
               <a:rPr lang="en-US" smtClean="0"/>
               <a:pPr/>
-              <a:t>12/17/15</a:t>
+              <a:t>12/22/15</a:t>
             </a:fld>
             <a:endParaRPr lang="en-US"/>
           </a:p>
@@ -2618,7 +2618,7 @@
             <a:fld id="{1AE5FCF6-443D-FE4F-BC6D-03009D78E84F}" type="datetime1">
               <a:rPr lang="en-US" smtClean="0"/>
               <a:pPr/>
-              <a:t>12/17/15</a:t>
+              <a:t>12/22/15</a:t>
             </a:fld>
             <a:endParaRPr lang="en-US"/>
           </a:p>
@@ -2892,7 +2892,7 @@
             <a:fld id="{7DAE50BD-CCE4-454D-9E10-26EB1BD059E5}" type="datetime1">
               <a:rPr lang="en-US" smtClean="0"/>
               <a:pPr/>
-              <a:t>12/17/15</a:t>
+              <a:t>12/22/15</a:t>
             </a:fld>
             <a:endParaRPr lang="en-US"/>
           </a:p>
@@ -3142,7 +3142,7 @@
             <a:fld id="{F12F5EFF-B37D-934E-B19A-DE804F70C788}" type="datetime1">
               <a:rPr lang="en-US" smtClean="0"/>
               <a:pPr/>
-              <a:t>12/17/15</a:t>
+              <a:t>12/22/15</a:t>
             </a:fld>
             <a:endParaRPr lang="en-US"/>
           </a:p>
@@ -3352,7 +3352,7 @@
             <a:fld id="{1E19F6D2-17CE-264F-9DF1-2C69D7FC091A}" type="datetime1">
               <a:rPr lang="en-US" smtClean="0"/>
               <a:pPr/>
-              <a:t>12/17/15</a:t>
+              <a:t>12/22/15</a:t>
             </a:fld>
             <a:endParaRPr lang="en-US"/>
           </a:p>
@@ -4355,12 +4355,41 @@
               </a:rPr>
               <a:t>Features from Engineering (for the quarter)</a:t>
             </a:r>
+            <a:endParaRPr lang="en-US" b="1" dirty="0" smtClean="0">
+              <a:solidFill>
+                <a:srgbClr val="4F81BD"/>
+              </a:solidFill>
+            </a:endParaRPr>
           </a:p>
           <a:p>
             <a:pPr lvl="1"/>
             <a:r>
               <a:rPr lang="en-US" dirty="0" smtClean="0"/>
-              <a:t>Open &gt; Close more than 50% of the time</a:t>
+              <a:t>Close</a:t>
+            </a:r>
+            <a:r>
+              <a:rPr lang="en-US" dirty="0" smtClean="0"/>
+              <a:t> </a:t>
+            </a:r>
+            <a:r>
+              <a:rPr lang="en-US" dirty="0" smtClean="0"/>
+              <a:t>&gt;</a:t>
+            </a:r>
+            <a:r>
+              <a:rPr lang="en-US" dirty="0" smtClean="0"/>
+              <a:t> </a:t>
+            </a:r>
+            <a:r>
+              <a:rPr lang="en-US" dirty="0" smtClean="0"/>
+              <a:t>Open</a:t>
+            </a:r>
+            <a:r>
+              <a:rPr lang="en-US" dirty="0" smtClean="0"/>
+              <a:t> </a:t>
+            </a:r>
+            <a:r>
+              <a:rPr lang="en-US" dirty="0" smtClean="0"/>
+              <a:t>more than 50% of the time</a:t>
             </a:r>
           </a:p>
           <a:p>
@@ -4983,7 +5012,27 @@
             <a:pPr lvl="1"/>
             <a:r>
               <a:rPr lang="en-US" dirty="0" smtClean="0"/>
-              <a:t>Bad: Better at modeling data where there’s a single decision boundary</a:t>
+              <a:t>Bad: Better at modeling data where there’s </a:t>
+            </a:r>
+            <a:r>
+              <a:rPr lang="en-US" smtClean="0"/>
+              <a:t>a</a:t>
+            </a:r>
+            <a:r>
+              <a:rPr lang="en-US" smtClean="0"/>
+              <a:t> </a:t>
+            </a:r>
+            <a:r>
+              <a:rPr lang="en-US" smtClean="0"/>
+              <a:t>linear</a:t>
+            </a:r>
+            <a:r>
+              <a:rPr lang="en-US" smtClean="0"/>
+              <a:t> </a:t>
+            </a:r>
+            <a:r>
+              <a:rPr lang="en-US" dirty="0" smtClean="0"/>
+              <a:t>decision boundary</a:t>
             </a:r>
           </a:p>
           <a:p>
@@ -5135,11 +5184,7 @@
           <a:p>
             <a:r>
               <a:rPr lang="en-US" dirty="0" smtClean="0"/>
-              <a:t>EE6893 </a:t>
-            </a:r>
-            <a:r>
-              <a:rPr lang="en-US" dirty="0" smtClean="0"/>
-              <a:t>Big Data Analytics</a:t>
+              <a:t>EE6893 Big Data Analytics</a:t>
             </a:r>
           </a:p>
           <a:p>
@@ -5262,29 +5307,8 @@
                   <a:schemeClr val="accent1"/>
                 </a:solidFill>
               </a:rPr>
-              <a:t>6</a:t>
-            </a:r>
-            <a:r>
-              <a:rPr lang="en-US" dirty="0" smtClean="0">
-                <a:solidFill>
-                  <a:schemeClr val="accent1"/>
-                </a:solidFill>
-              </a:rPr>
-              <a:t>0</a:t>
-            </a:r>
-            <a:r>
-              <a:rPr lang="en-US" dirty="0" smtClean="0">
-                <a:solidFill>
-                  <a:schemeClr val="accent1"/>
-                </a:solidFill>
-              </a:rPr>
-              <a:t>% of data used for training the model</a:t>
-            </a:r>
-            <a:endParaRPr lang="en-US" dirty="0" smtClean="0">
-              <a:solidFill>
-                <a:schemeClr val="accent1"/>
-              </a:solidFill>
-            </a:endParaRPr>
+              <a:t>60% of data used for training the model</a:t>
+            </a:r>
           </a:p>
           <a:p>
             <a:r>
@@ -5293,23 +5317,7 @@
                   <a:srgbClr val="4F81BD"/>
                 </a:solidFill>
               </a:rPr>
-              <a:t>4</a:t>
-            </a:r>
-            <a:r>
-              <a:rPr lang="en-US" dirty="0" smtClean="0">
-                <a:solidFill>
-                  <a:srgbClr val="4F81BD"/>
-                </a:solidFill>
-              </a:rPr>
-              <a:t>0</a:t>
-            </a:r>
-            <a:r>
-              <a:rPr lang="en-US" dirty="0" smtClean="0">
-                <a:solidFill>
-                  <a:srgbClr val="4F81BD"/>
-                </a:solidFill>
-              </a:rPr>
-              <a:t>% used for evaluation</a:t>
+              <a:t>40% used for evaluation</a:t>
             </a:r>
           </a:p>
           <a:p>
@@ -5487,11 +5495,7 @@
             <a:pPr lvl="1"/>
             <a:r>
               <a:rPr lang="en-US" dirty="0" smtClean="0"/>
-              <a:t>How often</a:t>
-            </a:r>
-            <a:r>
-              <a:rPr lang="en-US" dirty="0" smtClean="0"/>
-              <a:t> are we correct?</a:t>
+              <a:t>How often are we correct?</a:t>
             </a:r>
           </a:p>
           <a:p>
@@ -5553,11 +5557,7 @@
           <a:p>
             <a:r>
               <a:rPr lang="en-US" dirty="0" smtClean="0"/>
-              <a:t>EE6893 </a:t>
-            </a:r>
-            <a:r>
-              <a:rPr lang="en-US" dirty="0" smtClean="0"/>
-              <a:t>Big Data Analytics</a:t>
+              <a:t>EE6893 Big Data Analytics</a:t>
             </a:r>
           </a:p>
           <a:p>
@@ -6947,11 +6947,7 @@
           <a:p>
             <a:r>
               <a:rPr lang="en-US" dirty="0" smtClean="0"/>
-              <a:t>EE6893 </a:t>
-            </a:r>
-            <a:r>
-              <a:rPr lang="en-US" dirty="0" smtClean="0"/>
-              <a:t>Big Data Analytics</a:t>
+              <a:t>EE6893 Big Data Analytics</a:t>
             </a:r>
           </a:p>
           <a:p>
@@ -7157,11 +7153,7 @@
           <a:p>
             <a:r>
               <a:rPr lang="en-US" dirty="0" smtClean="0"/>
-              <a:t>EE6893 </a:t>
-            </a:r>
-            <a:r>
-              <a:rPr lang="en-US" dirty="0" smtClean="0"/>
-              <a:t>Big Data Analytics</a:t>
+              <a:t>EE6893 Big Data Analytics</a:t>
             </a:r>
           </a:p>
           <a:p>
@@ -7323,11 +7315,7 @@
             </a:r>
             <a:r>
               <a:rPr lang="en-US" dirty="0" smtClean="0"/>
-              <a:t>, </a:t>
-            </a:r>
-            <a:r>
-              <a:rPr lang="en-US" dirty="0" smtClean="0"/>
-              <a:t>etc). However, we only used</a:t>
+              <a:t>, etc). However, we only used</a:t>
             </a:r>
           </a:p>
           <a:p>
@@ -7348,11 +7336,7 @@
             </a:r>
             <a:r>
               <a:rPr lang="en-US" dirty="0" smtClean="0"/>
-              <a:t> </a:t>
-            </a:r>
-            <a:r>
-              <a:rPr lang="en-US" dirty="0" smtClean="0"/>
-              <a:t>library for building our models.</a:t>
+              <a:t> library for building our models.</a:t>
             </a:r>
           </a:p>
           <a:p>

</xml_diff>